<commit_message>
complete eng slide 0904
not merged
</commit_message>
<xml_diff>
--- a/slide_0904/20190904_urita_eng_heavy.pptx
+++ b/slide_0904/20190904_urita_eng_heavy.pptx
@@ -6,6 +6,7 @@
   </p:sldMasterIdLst>
   <p:sldIdLst>
     <p:sldId id="264" r:id="rId2"/>
+    <p:sldId id="265" r:id="rId3"/>
   </p:sldIdLst>
   <p:sldSz cx="9144000" cy="6858000" type="screen4x3"/>
   <p:notesSz cx="6858000" cy="9144000"/>
@@ -2354,1063 +2355,107 @@
           </a:p>
         </p:txBody>
       </p:sp>
-      <mc:AlternateContent xmlns:mc="http://schemas.openxmlformats.org/markup-compatibility/2006">
-        <mc:Choice xmlns:a14="http://schemas.microsoft.com/office/drawing/2010/main" Requires="a14">
-          <p:sp>
-            <p:nvSpPr>
-              <p:cNvPr id="3" name="コンテンツ プレースホルダー 2"/>
-              <p:cNvSpPr>
-                <a:spLocks noGrp="1"/>
-              </p:cNvSpPr>
-              <p:nvPr>
-                <p:ph idx="1"/>
-              </p:nvPr>
-            </p:nvSpPr>
-            <p:spPr/>
-            <p:txBody>
-              <a:bodyPr/>
-              <a:lstStyle/>
-              <a:p>
-                <a:r>
-                  <a:rPr lang="ja-JP" altLang="en-US" dirty="0" smtClean="0"/>
-                  <a:t>弱識別</a:t>
-                </a:r>
-                <a:r>
-                  <a:rPr lang="ja-JP" altLang="en-US" dirty="0"/>
-                  <a:t>器</a:t>
-                </a:r>
-                <a:r>
-                  <a:rPr lang="ja-JP" altLang="en-US" dirty="0" smtClean="0"/>
-                  <a:t>を追加する際，勾配が大きいデータに</a:t>
-                </a:r>
-                <a:r>
-                  <a:rPr lang="en-US" altLang="ja-JP" dirty="0" smtClean="0"/>
-                  <a:t/>
-                </a:r>
-                <a:br>
-                  <a:rPr lang="en-US" altLang="ja-JP" dirty="0" smtClean="0"/>
-                </a:br>
-                <a:r>
-                  <a:rPr lang="ja-JP" altLang="en-US" dirty="0" smtClean="0"/>
-                  <a:t>対して適応することが重要である．</a:t>
-                </a:r>
-                <a:endParaRPr lang="en-US" altLang="ja-JP" dirty="0" smtClean="0"/>
-              </a:p>
-              <a:p>
-                <a:r>
-                  <a:rPr kumimoji="1" lang="ja-JP" altLang="en-US" dirty="0" smtClean="0"/>
-                  <a:t>勾配の上位</a:t>
-                </a:r>
-                <a:r>
-                  <a:rPr kumimoji="1" lang="en-US" altLang="ja-JP" i="1" dirty="0" smtClean="0">
-                    <a:latin typeface="Times New Roman" panose="02020603050405020304" pitchFamily="18" charset="0"/>
-                    <a:cs typeface="Times New Roman" panose="02020603050405020304" pitchFamily="18" charset="0"/>
-                  </a:rPr>
-                  <a:t>a</a:t>
-                </a:r>
-                <a:r>
-                  <a:rPr kumimoji="1" lang="en-US" altLang="ja-JP" dirty="0" smtClean="0"/>
-                  <a:t>%</a:t>
-                </a:r>
-                <a:r>
-                  <a:rPr kumimoji="1" lang="ja-JP" altLang="en-US" dirty="0" smtClean="0"/>
-                  <a:t>のデータはすべて使用し，残りのデータから</a:t>
-                </a:r>
-                <a:r>
-                  <a:rPr kumimoji="1" lang="en-US" altLang="ja-JP" i="1" dirty="0" smtClean="0">
-                    <a:latin typeface="Times New Roman" panose="02020603050405020304" pitchFamily="18" charset="0"/>
-                    <a:cs typeface="Times New Roman" panose="02020603050405020304" pitchFamily="18" charset="0"/>
-                  </a:rPr>
-                  <a:t>b</a:t>
-                </a:r>
-                <a:r>
-                  <a:rPr kumimoji="1" lang="en-US" altLang="ja-JP" dirty="0" smtClean="0"/>
-                  <a:t>%</a:t>
-                </a:r>
-                <a:r>
-                  <a:rPr kumimoji="1" lang="ja-JP" altLang="en-US" dirty="0" smtClean="0"/>
-                  <a:t>をランダムサンプリングする．</a:t>
-                </a:r>
-                <a:endParaRPr kumimoji="1" lang="en-US" altLang="ja-JP" dirty="0" smtClean="0"/>
-              </a:p>
-              <a:p>
-                <a:r>
-                  <a:rPr lang="ja-JP" altLang="en-US" dirty="0" smtClean="0"/>
-                  <a:t>近似情報ゲイン</a:t>
-                </a:r>
-                <a:r>
-                  <a:rPr lang="en-US" altLang="ja-JP" dirty="0" smtClean="0"/>
-                  <a:t>(</a:t>
-                </a:r>
-                <a:r>
-                  <a:rPr lang="ja-JP" altLang="en-US" dirty="0" smtClean="0"/>
-                  <a:t>分散ゲイン</a:t>
-                </a:r>
-                <a:r>
-                  <a:rPr lang="en-US" altLang="ja-JP" dirty="0" smtClean="0"/>
-                  <a:t>)</a:t>
-                </a:r>
-                <a:r>
-                  <a:rPr lang="ja-JP" altLang="en-US" dirty="0" smtClean="0"/>
-                  <a:t>を以下のように定義</a:t>
-                </a:r>
-                <a:endParaRPr lang="en-US" altLang="ja-JP" dirty="0" smtClean="0"/>
-              </a:p>
-              <a:p>
-                <a:pPr/>
-                <a14:m>
-                  <m:oMathPara xmlns:m="http://schemas.openxmlformats.org/officeDocument/2006/math">
-                    <m:oMathParaPr>
-                      <m:jc m:val="centerGroup"/>
-                    </m:oMathParaPr>
-                    <m:oMath xmlns:m="http://schemas.openxmlformats.org/officeDocument/2006/math">
-                      <m:r>
-                        <m:rPr>
-                          <m:nor/>
-                        </m:rPr>
-                        <a:rPr kumimoji="1" lang="en-US" altLang="ja-JP" sz="2000" b="0" i="1" smtClean="0">
-                          <a:latin typeface="Times New Roman" panose="02020603050405020304" pitchFamily="18" charset="0"/>
-                          <a:cs typeface="Times New Roman" panose="02020603050405020304" pitchFamily="18" charset="0"/>
-                        </a:rPr>
-                        <m:t>V</m:t>
-                      </m:r>
-                      <m:r>
-                        <m:rPr>
-                          <m:nor/>
-                        </m:rPr>
-                        <a:rPr kumimoji="1" lang="en-US" altLang="ja-JP" sz="2000" b="0" i="1" baseline="-25000" smtClean="0">
-                          <a:latin typeface="Times New Roman" panose="02020603050405020304" pitchFamily="18" charset="0"/>
-                          <a:cs typeface="Times New Roman" panose="02020603050405020304" pitchFamily="18" charset="0"/>
-                        </a:rPr>
-                        <m:t>j</m:t>
-                      </m:r>
-                      <m:d>
-                        <m:dPr>
-                          <m:ctrlPr>
-                            <a:rPr kumimoji="1" lang="en-US" altLang="ja-JP" sz="2000" b="0" i="1" smtClean="0">
-                              <a:latin typeface="Cambria Math" panose="02040503050406030204" pitchFamily="18" charset="0"/>
-                            </a:rPr>
-                          </m:ctrlPr>
-                        </m:dPr>
-                        <m:e>
-                          <m:r>
-                            <m:rPr>
-                              <m:nor/>
-                            </m:rPr>
-                            <a:rPr kumimoji="1" lang="en-US" altLang="ja-JP" sz="2000" b="0" i="1" smtClean="0">
-                              <a:latin typeface="Times New Roman" panose="02020603050405020304" pitchFamily="18" charset="0"/>
-                              <a:cs typeface="Times New Roman" panose="02020603050405020304" pitchFamily="18" charset="0"/>
-                            </a:rPr>
-                            <m:t>d</m:t>
-                          </m:r>
-                        </m:e>
-                      </m:d>
-                      <m:r>
-                        <m:rPr>
-                          <m:nor/>
-                        </m:rPr>
-                        <a:rPr kumimoji="1" lang="en-US" altLang="ja-JP" sz="2000" b="0" i="1" smtClean="0">
-                          <a:latin typeface="Times New Roman" panose="02020603050405020304" pitchFamily="18" charset="0"/>
-                          <a:cs typeface="Times New Roman" panose="02020603050405020304" pitchFamily="18" charset="0"/>
-                        </a:rPr>
-                        <m:t>=</m:t>
-                      </m:r>
-                      <m:f>
-                        <m:fPr>
-                          <m:ctrlPr>
-                            <a:rPr kumimoji="1" lang="en-US" altLang="ja-JP" sz="2000" b="0" i="1" smtClean="0">
-                              <a:latin typeface="Cambria Math" panose="02040503050406030204" pitchFamily="18" charset="0"/>
-                            </a:rPr>
-                          </m:ctrlPr>
-                        </m:fPr>
-                        <m:num>
-                          <m:r>
-                            <m:rPr>
-                              <m:nor/>
-                            </m:rPr>
-                            <a:rPr kumimoji="1" lang="en-US" altLang="ja-JP" sz="2000" b="0" smtClean="0">
-                              <a:latin typeface="Times New Roman" panose="02020603050405020304" pitchFamily="18" charset="0"/>
-                              <a:cs typeface="Times New Roman" panose="02020603050405020304" pitchFamily="18" charset="0"/>
-                            </a:rPr>
-                            <m:t>1</m:t>
-                          </m:r>
-                        </m:num>
-                        <m:den>
-                          <m:r>
-                            <m:rPr>
-                              <m:nor/>
-                            </m:rPr>
-                            <a:rPr kumimoji="1" lang="en-US" altLang="ja-JP" sz="2000" b="0" i="1" smtClean="0">
-                              <a:latin typeface="Times New Roman" panose="02020603050405020304" pitchFamily="18" charset="0"/>
-                              <a:cs typeface="Times New Roman" panose="02020603050405020304" pitchFamily="18" charset="0"/>
-                            </a:rPr>
-                            <m:t>n</m:t>
-                          </m:r>
-                        </m:den>
-                      </m:f>
-                      <m:d>
-                        <m:dPr>
-                          <m:ctrlPr>
-                            <a:rPr kumimoji="1" lang="en-US" altLang="ja-JP" sz="2000" b="0" i="1" smtClean="0">
-                              <a:latin typeface="Cambria Math" panose="02040503050406030204" pitchFamily="18" charset="0"/>
-                            </a:rPr>
-                          </m:ctrlPr>
-                        </m:dPr>
-                        <m:e>
-                          <m:f>
-                            <m:fPr>
-                              <m:ctrlPr>
-                                <a:rPr lang="en-US" altLang="ja-JP" sz="2000" i="1">
-                                  <a:latin typeface="Cambria Math" panose="02040503050406030204" pitchFamily="18" charset="0"/>
-                                </a:rPr>
-                              </m:ctrlPr>
-                            </m:fPr>
-                            <m:num>
-                              <m:d>
-                                <m:dPr>
-                                  <m:ctrlPr>
-                                    <a:rPr lang="en-US" altLang="ja-JP" sz="2000" i="1">
-                                      <a:latin typeface="Cambria Math" panose="02040503050406030204" pitchFamily="18" charset="0"/>
-                                    </a:rPr>
-                                  </m:ctrlPr>
-                                </m:dPr>
-                                <m:e>
-                                  <m:nary>
-                                    <m:naryPr>
-                                      <m:chr m:val="∑"/>
-                                      <m:supHide m:val="on"/>
-                                      <m:ctrlPr>
-                                        <a:rPr lang="en-US" altLang="ja-JP" sz="2000" i="1">
-                                          <a:latin typeface="Cambria Math" panose="02040503050406030204" pitchFamily="18" charset="0"/>
-                                        </a:rPr>
-                                      </m:ctrlPr>
-                                    </m:naryPr>
-                                    <m:sub>
-                                      <m:r>
-                                        <m:rPr>
-                                          <m:nor/>
-                                        </m:rPr>
-                                        <a:rPr lang="en-US" altLang="ja-JP" sz="2000" i="1">
-                                          <a:latin typeface="Times New Roman" panose="02020603050405020304" pitchFamily="18" charset="0"/>
-                                          <a:cs typeface="Times New Roman" panose="02020603050405020304" pitchFamily="18" charset="0"/>
-                                        </a:rPr>
-                                        <m:t>x</m:t>
-                                      </m:r>
-                                      <m:r>
-                                        <m:rPr>
-                                          <m:nor/>
-                                        </m:rPr>
-                                        <a:rPr lang="en-US" altLang="ja-JP" sz="2000" i="1" baseline="-25000">
-                                          <a:latin typeface="Times New Roman" panose="02020603050405020304" pitchFamily="18" charset="0"/>
-                                          <a:cs typeface="Times New Roman" panose="02020603050405020304" pitchFamily="18" charset="0"/>
-                                        </a:rPr>
-                                        <m:t>i</m:t>
-                                      </m:r>
-                                      <m:r>
-                                        <m:rPr>
-                                          <m:nor/>
-                                        </m:rPr>
-                                        <a:rPr lang="en-US" altLang="ja-JP" sz="2000">
-                                          <a:latin typeface="Times New Roman" panose="02020603050405020304" pitchFamily="18" charset="0"/>
-                                          <a:ea typeface="Cambria Math" panose="02040503050406030204" pitchFamily="18" charset="0"/>
-                                          <a:cs typeface="Times New Roman" panose="02020603050405020304" pitchFamily="18" charset="0"/>
-                                        </a:rPr>
-                                        <m:t>∈</m:t>
-                                      </m:r>
-                                      <m:r>
-                                        <m:rPr>
-                                          <m:nor/>
-                                        </m:rPr>
-                                        <a:rPr lang="en-US" altLang="ja-JP" sz="2000" i="1">
-                                          <a:latin typeface="Times New Roman" panose="02020603050405020304" pitchFamily="18" charset="0"/>
-                                          <a:ea typeface="Cambria Math" panose="02040503050406030204" pitchFamily="18" charset="0"/>
-                                          <a:cs typeface="Times New Roman" panose="02020603050405020304" pitchFamily="18" charset="0"/>
-                                        </a:rPr>
-                                        <m:t>A</m:t>
-                                      </m:r>
-                                      <m:r>
-                                        <m:rPr>
-                                          <m:nor/>
-                                        </m:rPr>
-                                        <a:rPr lang="en-US" altLang="ja-JP" sz="2000" i="1" baseline="-25000">
-                                          <a:latin typeface="Times New Roman" panose="02020603050405020304" pitchFamily="18" charset="0"/>
-                                          <a:ea typeface="Cambria Math" panose="02040503050406030204" pitchFamily="18" charset="0"/>
-                                          <a:cs typeface="Times New Roman" panose="02020603050405020304" pitchFamily="18" charset="0"/>
-                                        </a:rPr>
-                                        <m:t>l</m:t>
-                                      </m:r>
-                                    </m:sub>
-                                    <m:sup/>
-                                    <m:e>
-                                      <m:r>
-                                        <m:rPr>
-                                          <m:nor/>
-                                        </m:rPr>
-                                        <a:rPr lang="en-US" altLang="ja-JP" sz="2000" i="1">
-                                          <a:latin typeface="Times New Roman" panose="02020603050405020304" pitchFamily="18" charset="0"/>
-                                          <a:ea typeface="Cambria Math" panose="02040503050406030204" pitchFamily="18" charset="0"/>
-                                          <a:cs typeface="Times New Roman" panose="02020603050405020304" pitchFamily="18" charset="0"/>
-                                        </a:rPr>
-                                        <m:t>g</m:t>
-                                      </m:r>
-                                      <m:r>
-                                        <m:rPr>
-                                          <m:nor/>
-                                        </m:rPr>
-                                        <a:rPr lang="en-US" altLang="ja-JP" sz="2000" i="1" baseline="-25000">
-                                          <a:latin typeface="Times New Roman" panose="02020603050405020304" pitchFamily="18" charset="0"/>
-                                          <a:ea typeface="Cambria Math" panose="02040503050406030204" pitchFamily="18" charset="0"/>
-                                          <a:cs typeface="Times New Roman" panose="02020603050405020304" pitchFamily="18" charset="0"/>
-                                        </a:rPr>
-                                        <m:t>i</m:t>
-                                      </m:r>
-                                      <m:r>
-                                        <m:rPr>
-                                          <m:nor/>
-                                        </m:rPr>
-                                        <a:rPr lang="en-US" altLang="ja-JP" sz="2000" i="1">
-                                          <a:latin typeface="Times New Roman" panose="02020603050405020304" pitchFamily="18" charset="0"/>
-                                          <a:ea typeface="Cambria Math" panose="02040503050406030204" pitchFamily="18" charset="0"/>
-                                          <a:cs typeface="Times New Roman" panose="02020603050405020304" pitchFamily="18" charset="0"/>
-                                        </a:rPr>
-                                        <m:t>+</m:t>
-                                      </m:r>
-                                      <m:f>
-                                        <m:fPr>
-                                          <m:ctrlPr>
-                                            <a:rPr lang="en-US" altLang="ja-JP" sz="2000" i="1">
-                                              <a:latin typeface="Cambria Math" panose="02040503050406030204" pitchFamily="18" charset="0"/>
-                                              <a:ea typeface="Cambria Math" panose="02040503050406030204" pitchFamily="18" charset="0"/>
-                                            </a:rPr>
-                                          </m:ctrlPr>
-                                        </m:fPr>
-                                        <m:num>
-                                          <m:r>
-                                            <m:rPr>
-                                              <m:nor/>
-                                            </m:rPr>
-                                            <a:rPr lang="en-US" altLang="ja-JP" sz="2000">
-                                              <a:latin typeface="Times New Roman" panose="02020603050405020304" pitchFamily="18" charset="0"/>
-                                              <a:ea typeface="Cambria Math" panose="02040503050406030204" pitchFamily="18" charset="0"/>
-                                              <a:cs typeface="Times New Roman" panose="02020603050405020304" pitchFamily="18" charset="0"/>
-                                            </a:rPr>
-                                            <m:t>1</m:t>
-                                          </m:r>
-                                          <m:r>
-                                            <m:rPr>
-                                              <m:nor/>
-                                            </m:rPr>
-                                            <a:rPr lang="en-US" altLang="ja-JP" sz="2000" i="1">
-                                              <a:latin typeface="Times New Roman" panose="02020603050405020304" pitchFamily="18" charset="0"/>
-                                              <a:ea typeface="Cambria Math" panose="02040503050406030204" pitchFamily="18" charset="0"/>
-                                              <a:cs typeface="Times New Roman" panose="02020603050405020304" pitchFamily="18" charset="0"/>
-                                            </a:rPr>
-                                            <m:t>−</m:t>
-                                          </m:r>
-                                          <m:r>
-                                            <m:rPr>
-                                              <m:nor/>
-                                            </m:rPr>
-                                            <a:rPr lang="en-US" altLang="ja-JP" sz="2000" i="1">
-                                              <a:latin typeface="Times New Roman" panose="02020603050405020304" pitchFamily="18" charset="0"/>
-                                              <a:ea typeface="Cambria Math" panose="02040503050406030204" pitchFamily="18" charset="0"/>
-                                              <a:cs typeface="Times New Roman" panose="02020603050405020304" pitchFamily="18" charset="0"/>
-                                            </a:rPr>
-                                            <m:t>a</m:t>
-                                          </m:r>
-                                        </m:num>
-                                        <m:den>
-                                          <m:r>
-                                            <m:rPr>
-                                              <m:nor/>
-                                            </m:rPr>
-                                            <a:rPr lang="en-US" altLang="ja-JP" sz="2000" i="1">
-                                              <a:latin typeface="Times New Roman" panose="02020603050405020304" pitchFamily="18" charset="0"/>
-                                              <a:ea typeface="Cambria Math" panose="02040503050406030204" pitchFamily="18" charset="0"/>
-                                              <a:cs typeface="Times New Roman" panose="02020603050405020304" pitchFamily="18" charset="0"/>
-                                            </a:rPr>
-                                            <m:t>b</m:t>
-                                          </m:r>
-                                        </m:den>
-                                      </m:f>
-                                      <m:nary>
-                                        <m:naryPr>
-                                          <m:chr m:val="∑"/>
-                                          <m:supHide m:val="on"/>
-                                          <m:ctrlPr>
-                                            <a:rPr lang="en-US" altLang="ja-JP" sz="2000" i="1">
-                                              <a:latin typeface="Cambria Math" panose="02040503050406030204" pitchFamily="18" charset="0"/>
-                                              <a:ea typeface="Cambria Math" panose="02040503050406030204" pitchFamily="18" charset="0"/>
-                                            </a:rPr>
-                                          </m:ctrlPr>
-                                        </m:naryPr>
-                                        <m:sub>
-                                          <m:r>
-                                            <m:rPr>
-                                              <m:nor/>
-                                            </m:rPr>
-                                            <a:rPr lang="en-US" altLang="ja-JP" sz="2000" i="1">
-                                              <a:latin typeface="Times New Roman" panose="02020603050405020304" pitchFamily="18" charset="0"/>
-                                              <a:ea typeface="Cambria Math" panose="02040503050406030204" pitchFamily="18" charset="0"/>
-                                              <a:cs typeface="Times New Roman" panose="02020603050405020304" pitchFamily="18" charset="0"/>
-                                            </a:rPr>
-                                            <m:t>x</m:t>
-                                          </m:r>
-                                          <m:r>
-                                            <m:rPr>
-                                              <m:nor/>
-                                            </m:rPr>
-                                            <a:rPr lang="en-US" altLang="ja-JP" sz="2000" i="1" baseline="-25000">
-                                              <a:latin typeface="Times New Roman" panose="02020603050405020304" pitchFamily="18" charset="0"/>
-                                              <a:ea typeface="Cambria Math" panose="02040503050406030204" pitchFamily="18" charset="0"/>
-                                              <a:cs typeface="Times New Roman" panose="02020603050405020304" pitchFamily="18" charset="0"/>
-                                            </a:rPr>
-                                            <m:t>i</m:t>
-                                          </m:r>
-                                          <m:r>
-                                            <m:rPr>
-                                              <m:nor/>
-                                            </m:rPr>
-                                            <a:rPr lang="en-US" altLang="ja-JP" sz="2000">
-                                              <a:latin typeface="Times New Roman" panose="02020603050405020304" pitchFamily="18" charset="0"/>
-                                              <a:ea typeface="Cambria Math" panose="02040503050406030204" pitchFamily="18" charset="0"/>
-                                              <a:cs typeface="Times New Roman" panose="02020603050405020304" pitchFamily="18" charset="0"/>
-                                            </a:rPr>
-                                            <m:t>∈</m:t>
-                                          </m:r>
-                                          <m:r>
-                                            <m:rPr>
-                                              <m:nor/>
-                                            </m:rPr>
-                                            <a:rPr lang="en-US" altLang="ja-JP" sz="2000" i="1">
-                                              <a:latin typeface="Times New Roman" panose="02020603050405020304" pitchFamily="18" charset="0"/>
-                                              <a:ea typeface="Cambria Math" panose="02040503050406030204" pitchFamily="18" charset="0"/>
-                                              <a:cs typeface="Times New Roman" panose="02020603050405020304" pitchFamily="18" charset="0"/>
-                                            </a:rPr>
-                                            <m:t>B</m:t>
-                                          </m:r>
-                                          <m:r>
-                                            <m:rPr>
-                                              <m:nor/>
-                                            </m:rPr>
-                                            <a:rPr lang="en-US" altLang="ja-JP" sz="2000" i="1" baseline="-25000">
-                                              <a:latin typeface="Times New Roman" panose="02020603050405020304" pitchFamily="18" charset="0"/>
-                                              <a:ea typeface="Cambria Math" panose="02040503050406030204" pitchFamily="18" charset="0"/>
-                                              <a:cs typeface="Times New Roman" panose="02020603050405020304" pitchFamily="18" charset="0"/>
-                                            </a:rPr>
-                                            <m:t>l</m:t>
-                                          </m:r>
-                                        </m:sub>
-                                        <m:sup/>
-                                        <m:e>
-                                          <m:r>
-                                            <m:rPr>
-                                              <m:nor/>
-                                            </m:rPr>
-                                            <a:rPr lang="en-US" altLang="ja-JP" sz="2000" i="1">
-                                              <a:latin typeface="Times New Roman" panose="02020603050405020304" pitchFamily="18" charset="0"/>
-                                              <a:ea typeface="Cambria Math" panose="02040503050406030204" pitchFamily="18" charset="0"/>
-                                              <a:cs typeface="Times New Roman" panose="02020603050405020304" pitchFamily="18" charset="0"/>
-                                            </a:rPr>
-                                            <m:t>g</m:t>
-                                          </m:r>
-                                          <m:r>
-                                            <m:rPr>
-                                              <m:nor/>
-                                            </m:rPr>
-                                            <a:rPr lang="en-US" altLang="ja-JP" sz="2000" i="1" baseline="-25000">
-                                              <a:latin typeface="Times New Roman" panose="02020603050405020304" pitchFamily="18" charset="0"/>
-                                              <a:ea typeface="Cambria Math" panose="02040503050406030204" pitchFamily="18" charset="0"/>
-                                              <a:cs typeface="Times New Roman" panose="02020603050405020304" pitchFamily="18" charset="0"/>
-                                            </a:rPr>
-                                            <m:t>i</m:t>
-                                          </m:r>
-                                        </m:e>
-                                      </m:nary>
-                                    </m:e>
-                                  </m:nary>
-                                  <m:r>
-                                    <m:rPr>
-                                      <m:nor/>
-                                    </m:rPr>
-                                    <a:rPr lang="en-US" altLang="ja-JP" sz="2000" i="1">
-                                      <a:latin typeface="Times New Roman" panose="02020603050405020304" pitchFamily="18" charset="0"/>
-                                      <a:ea typeface="Cambria Math" panose="02040503050406030204" pitchFamily="18" charset="0"/>
-                                      <a:cs typeface="Times New Roman" panose="02020603050405020304" pitchFamily="18" charset="0"/>
-                                    </a:rPr>
-                                    <m:t> </m:t>
-                                  </m:r>
-                                </m:e>
-                              </m:d>
-                              <m:r>
-                                <m:rPr>
-                                  <m:nor/>
-                                </m:rPr>
-                                <a:rPr lang="en-US" altLang="ja-JP" sz="2000" baseline="30000">
-                                  <a:latin typeface="Times New Roman" panose="02020603050405020304" pitchFamily="18" charset="0"/>
-                                  <a:ea typeface="Cambria Math" panose="02040503050406030204" pitchFamily="18" charset="0"/>
-                                  <a:cs typeface="Times New Roman" panose="02020603050405020304" pitchFamily="18" charset="0"/>
-                                </a:rPr>
-                                <m:t>2</m:t>
-                              </m:r>
-                            </m:num>
-                            <m:den>
-                              <m:sSubSup>
-                                <m:sSubSupPr>
-                                  <m:ctrlPr>
-                                    <a:rPr lang="en-US" altLang="ja-JP" sz="2000" i="1" smtClean="0">
-                                      <a:latin typeface="Cambria Math" panose="02040503050406030204" pitchFamily="18" charset="0"/>
-                                      <a:ea typeface="Cambria Math" panose="02040503050406030204" pitchFamily="18" charset="0"/>
-                                      <a:cs typeface="Times New Roman" panose="02020603050405020304" pitchFamily="18" charset="0"/>
-                                    </a:rPr>
-                                  </m:ctrlPr>
-                                </m:sSubSupPr>
-                                <m:e>
-                                  <m:r>
-                                    <m:rPr>
-                                      <m:nor/>
-                                    </m:rPr>
-                                    <a:rPr lang="en-US" altLang="ja-JP" sz="2000" i="1">
-                                      <a:latin typeface="Times New Roman" panose="02020603050405020304" pitchFamily="18" charset="0"/>
-                                      <a:ea typeface="Cambria Math" panose="02040503050406030204" pitchFamily="18" charset="0"/>
-                                      <a:cs typeface="Times New Roman" panose="02020603050405020304" pitchFamily="18" charset="0"/>
-                                    </a:rPr>
-                                    <m:t>n</m:t>
-                                  </m:r>
-                                </m:e>
-                                <m:sub>
-                                  <m:r>
-                                    <m:rPr>
-                                      <m:nor/>
-                                    </m:rPr>
-                                    <a:rPr lang="en-US" altLang="ja-JP" sz="2000" b="0" i="1" smtClean="0">
-                                      <a:latin typeface="Times New Roman" panose="02020603050405020304" pitchFamily="18" charset="0"/>
-                                      <a:ea typeface="Cambria Math" panose="02040503050406030204" pitchFamily="18" charset="0"/>
-                                      <a:cs typeface="Times New Roman" panose="02020603050405020304" pitchFamily="18" charset="0"/>
-                                    </a:rPr>
-                                    <m:t>i</m:t>
-                                  </m:r>
-                                </m:sub>
-                                <m:sup>
-                                  <m:r>
-                                    <m:rPr>
-                                      <m:nor/>
-                                    </m:rPr>
-                                    <a:rPr lang="en-US" altLang="ja-JP" sz="2000" b="0" i="1" smtClean="0">
-                                      <a:latin typeface="Times New Roman" panose="02020603050405020304" pitchFamily="18" charset="0"/>
-                                      <a:ea typeface="Cambria Math" panose="02040503050406030204" pitchFamily="18" charset="0"/>
-                                      <a:cs typeface="Times New Roman" panose="02020603050405020304" pitchFamily="18" charset="0"/>
-                                    </a:rPr>
-                                    <m:t>j</m:t>
-                                  </m:r>
-                                </m:sup>
-                              </m:sSubSup>
-                              <m:r>
-                                <m:rPr>
-                                  <m:nor/>
-                                </m:rPr>
-                                <a:rPr lang="en-US" altLang="ja-JP" sz="2000" b="0" smtClean="0">
-                                  <a:latin typeface="Times New Roman" panose="02020603050405020304" pitchFamily="18" charset="0"/>
-                                  <a:ea typeface="Cambria Math" panose="02040503050406030204" pitchFamily="18" charset="0"/>
-                                  <a:cs typeface="Times New Roman" panose="02020603050405020304" pitchFamily="18" charset="0"/>
-                                </a:rPr>
-                                <m:t>(</m:t>
-                              </m:r>
-                              <m:r>
-                                <m:rPr>
-                                  <m:nor/>
-                                </m:rPr>
-                                <a:rPr lang="en-US" altLang="ja-JP" sz="2000" b="0" i="1" smtClean="0">
-                                  <a:latin typeface="Times New Roman" panose="02020603050405020304" pitchFamily="18" charset="0"/>
-                                  <a:ea typeface="Cambria Math" panose="02040503050406030204" pitchFamily="18" charset="0"/>
-                                  <a:cs typeface="Times New Roman" panose="02020603050405020304" pitchFamily="18" charset="0"/>
-                                </a:rPr>
-                                <m:t>d</m:t>
-                              </m:r>
-                              <m:r>
-                                <m:rPr>
-                                  <m:nor/>
-                                </m:rPr>
-                                <a:rPr lang="en-US" altLang="ja-JP" sz="2000" b="0" smtClean="0">
-                                  <a:latin typeface="Times New Roman" panose="02020603050405020304" pitchFamily="18" charset="0"/>
-                                  <a:ea typeface="Cambria Math" panose="02040503050406030204" pitchFamily="18" charset="0"/>
-                                  <a:cs typeface="Times New Roman" panose="02020603050405020304" pitchFamily="18" charset="0"/>
-                                </a:rPr>
-                                <m:t>)</m:t>
-                              </m:r>
-                            </m:den>
-                          </m:f>
-                        </m:e>
-                      </m:d>
-                      <m:r>
-                        <a:rPr lang="en-US" altLang="ja-JP" sz="2000" b="0" i="1" smtClean="0">
-                          <a:latin typeface="Cambria Math" panose="02040503050406030204" pitchFamily="18" charset="0"/>
-                          <a:ea typeface="Cambria Math" panose="02040503050406030204" pitchFamily="18" charset="0"/>
-                          <a:cs typeface="Times New Roman" panose="02020603050405020304" pitchFamily="18" charset="0"/>
-                        </a:rPr>
-                        <m:t>+</m:t>
-                      </m:r>
-                      <m:f>
-                        <m:fPr>
-                          <m:ctrlPr>
-                            <a:rPr lang="en-US" altLang="ja-JP" sz="2400" i="1" smtClean="0">
-                              <a:latin typeface="Cambria Math" panose="02040503050406030204" pitchFamily="18" charset="0"/>
-                            </a:rPr>
-                          </m:ctrlPr>
-                        </m:fPr>
-                        <m:num>
-                          <m:r>
-                            <m:rPr>
-                              <m:nor/>
-                            </m:rPr>
-                            <a:rPr lang="en-US" altLang="ja-JP" sz="2400">
-                              <a:latin typeface="Times New Roman" panose="02020603050405020304" pitchFamily="18" charset="0"/>
-                              <a:cs typeface="Times New Roman" panose="02020603050405020304" pitchFamily="18" charset="0"/>
-                            </a:rPr>
-                            <m:t>1</m:t>
-                          </m:r>
-                        </m:num>
-                        <m:den>
-                          <m:r>
-                            <m:rPr>
-                              <m:nor/>
-                            </m:rPr>
-                            <a:rPr lang="en-US" altLang="ja-JP" sz="2400" i="1">
-                              <a:latin typeface="Times New Roman" panose="02020603050405020304" pitchFamily="18" charset="0"/>
-                              <a:cs typeface="Times New Roman" panose="02020603050405020304" pitchFamily="18" charset="0"/>
-                            </a:rPr>
-                            <m:t>n</m:t>
-                          </m:r>
-                        </m:den>
-                      </m:f>
-                      <m:d>
-                        <m:dPr>
-                          <m:ctrlPr>
-                            <a:rPr lang="en-US" altLang="ja-JP" sz="2400" i="1">
-                              <a:latin typeface="Cambria Math" panose="02040503050406030204" pitchFamily="18" charset="0"/>
-                            </a:rPr>
-                          </m:ctrlPr>
-                        </m:dPr>
-                        <m:e>
-                          <m:f>
-                            <m:fPr>
-                              <m:ctrlPr>
-                                <a:rPr lang="en-US" altLang="ja-JP" sz="2400" i="1">
-                                  <a:latin typeface="Cambria Math" panose="02040503050406030204" pitchFamily="18" charset="0"/>
-                                </a:rPr>
-                              </m:ctrlPr>
-                            </m:fPr>
-                            <m:num>
-                              <m:d>
-                                <m:dPr>
-                                  <m:ctrlPr>
-                                    <a:rPr lang="en-US" altLang="ja-JP" sz="2400" i="1">
-                                      <a:latin typeface="Cambria Math" panose="02040503050406030204" pitchFamily="18" charset="0"/>
-                                    </a:rPr>
-                                  </m:ctrlPr>
-                                </m:dPr>
-                                <m:e>
-                                  <m:nary>
-                                    <m:naryPr>
-                                      <m:chr m:val="∑"/>
-                                      <m:supHide m:val="on"/>
-                                      <m:ctrlPr>
-                                        <a:rPr lang="en-US" altLang="ja-JP" sz="2400" i="1">
-                                          <a:latin typeface="Cambria Math" panose="02040503050406030204" pitchFamily="18" charset="0"/>
-                                        </a:rPr>
-                                      </m:ctrlPr>
-                                    </m:naryPr>
-                                    <m:sub>
-                                      <m:r>
-                                        <m:rPr>
-                                          <m:nor/>
-                                        </m:rPr>
-                                        <a:rPr lang="en-US" altLang="ja-JP" sz="2400" i="1">
-                                          <a:latin typeface="Times New Roman" panose="02020603050405020304" pitchFamily="18" charset="0"/>
-                                          <a:cs typeface="Times New Roman" panose="02020603050405020304" pitchFamily="18" charset="0"/>
-                                        </a:rPr>
-                                        <m:t>x</m:t>
-                                      </m:r>
-                                      <m:r>
-                                        <m:rPr>
-                                          <m:nor/>
-                                        </m:rPr>
-                                        <a:rPr lang="en-US" altLang="ja-JP" sz="2400" i="1" baseline="-25000">
-                                          <a:latin typeface="Times New Roman" panose="02020603050405020304" pitchFamily="18" charset="0"/>
-                                          <a:cs typeface="Times New Roman" panose="02020603050405020304" pitchFamily="18" charset="0"/>
-                                        </a:rPr>
-                                        <m:t>i</m:t>
-                                      </m:r>
-                                      <m:r>
-                                        <m:rPr>
-                                          <m:nor/>
-                                        </m:rPr>
-                                        <a:rPr lang="en-US" altLang="ja-JP" sz="2400" i="1">
-                                          <a:latin typeface="Times New Roman" panose="02020603050405020304" pitchFamily="18" charset="0"/>
-                                          <a:ea typeface="Cambria Math" panose="02040503050406030204" pitchFamily="18" charset="0"/>
-                                          <a:cs typeface="Times New Roman" panose="02020603050405020304" pitchFamily="18" charset="0"/>
-                                        </a:rPr>
-                                        <m:t>∈</m:t>
-                                      </m:r>
-                                      <m:r>
-                                        <m:rPr>
-                                          <m:nor/>
-                                        </m:rPr>
-                                        <a:rPr lang="en-US" altLang="ja-JP" sz="2400" i="1">
-                                          <a:latin typeface="Times New Roman" panose="02020603050405020304" pitchFamily="18" charset="0"/>
-                                          <a:ea typeface="Cambria Math" panose="02040503050406030204" pitchFamily="18" charset="0"/>
-                                          <a:cs typeface="Times New Roman" panose="02020603050405020304" pitchFamily="18" charset="0"/>
-                                        </a:rPr>
-                                        <m:t>Ar</m:t>
-                                      </m:r>
-                                    </m:sub>
-                                    <m:sup/>
-                                    <m:e>
-                                      <m:r>
-                                        <m:rPr>
-                                          <m:nor/>
-                                        </m:rPr>
-                                        <a:rPr lang="en-US" altLang="ja-JP" sz="2400" i="1">
-                                          <a:latin typeface="Times New Roman" panose="02020603050405020304" pitchFamily="18" charset="0"/>
-                                          <a:ea typeface="Cambria Math" panose="02040503050406030204" pitchFamily="18" charset="0"/>
-                                          <a:cs typeface="Times New Roman" panose="02020603050405020304" pitchFamily="18" charset="0"/>
-                                        </a:rPr>
-                                        <m:t>g</m:t>
-                                      </m:r>
-                                      <m:r>
-                                        <m:rPr>
-                                          <m:nor/>
-                                        </m:rPr>
-                                        <a:rPr lang="en-US" altLang="ja-JP" sz="2400" i="1" baseline="-25000">
-                                          <a:latin typeface="Times New Roman" panose="02020603050405020304" pitchFamily="18" charset="0"/>
-                                          <a:ea typeface="Cambria Math" panose="02040503050406030204" pitchFamily="18" charset="0"/>
-                                          <a:cs typeface="Times New Roman" panose="02020603050405020304" pitchFamily="18" charset="0"/>
-                                        </a:rPr>
-                                        <m:t>i</m:t>
-                                      </m:r>
-                                      <m:r>
-                                        <m:rPr>
-                                          <m:nor/>
-                                        </m:rPr>
-                                        <a:rPr lang="en-US" altLang="ja-JP" sz="2400" i="1">
-                                          <a:latin typeface="Times New Roman" panose="02020603050405020304" pitchFamily="18" charset="0"/>
-                                          <a:ea typeface="Cambria Math" panose="02040503050406030204" pitchFamily="18" charset="0"/>
-                                          <a:cs typeface="Times New Roman" panose="02020603050405020304" pitchFamily="18" charset="0"/>
-                                        </a:rPr>
-                                        <m:t>+</m:t>
-                                      </m:r>
-                                      <m:f>
-                                        <m:fPr>
-                                          <m:ctrlPr>
-                                            <a:rPr lang="en-US" altLang="ja-JP" sz="2400" i="1">
-                                              <a:latin typeface="Cambria Math" panose="02040503050406030204" pitchFamily="18" charset="0"/>
-                                              <a:ea typeface="Cambria Math" panose="02040503050406030204" pitchFamily="18" charset="0"/>
-                                            </a:rPr>
-                                          </m:ctrlPr>
-                                        </m:fPr>
-                                        <m:num>
-                                          <m:r>
-                                            <m:rPr>
-                                              <m:nor/>
-                                            </m:rPr>
-                                            <a:rPr lang="en-US" altLang="ja-JP" sz="2400">
-                                              <a:latin typeface="Times New Roman" panose="02020603050405020304" pitchFamily="18" charset="0"/>
-                                              <a:ea typeface="Cambria Math" panose="02040503050406030204" pitchFamily="18" charset="0"/>
-                                              <a:cs typeface="Times New Roman" panose="02020603050405020304" pitchFamily="18" charset="0"/>
-                                            </a:rPr>
-                                            <m:t>1</m:t>
-                                          </m:r>
-                                          <m:r>
-                                            <m:rPr>
-                                              <m:nor/>
-                                            </m:rPr>
-                                            <a:rPr lang="en-US" altLang="ja-JP" sz="2400" i="1">
-                                              <a:latin typeface="Times New Roman" panose="02020603050405020304" pitchFamily="18" charset="0"/>
-                                              <a:ea typeface="Cambria Math" panose="02040503050406030204" pitchFamily="18" charset="0"/>
-                                              <a:cs typeface="Times New Roman" panose="02020603050405020304" pitchFamily="18" charset="0"/>
-                                            </a:rPr>
-                                            <m:t>−</m:t>
-                                          </m:r>
-                                          <m:r>
-                                            <m:rPr>
-                                              <m:nor/>
-                                            </m:rPr>
-                                            <a:rPr lang="en-US" altLang="ja-JP" sz="2400" i="1">
-                                              <a:latin typeface="Times New Roman" panose="02020603050405020304" pitchFamily="18" charset="0"/>
-                                              <a:ea typeface="Cambria Math" panose="02040503050406030204" pitchFamily="18" charset="0"/>
-                                              <a:cs typeface="Times New Roman" panose="02020603050405020304" pitchFamily="18" charset="0"/>
-                                            </a:rPr>
-                                            <m:t>a</m:t>
-                                          </m:r>
-                                        </m:num>
-                                        <m:den>
-                                          <m:r>
-                                            <m:rPr>
-                                              <m:nor/>
-                                            </m:rPr>
-                                            <a:rPr lang="en-US" altLang="ja-JP" sz="2400" i="1">
-                                              <a:latin typeface="Times New Roman" panose="02020603050405020304" pitchFamily="18" charset="0"/>
-                                              <a:ea typeface="Cambria Math" panose="02040503050406030204" pitchFamily="18" charset="0"/>
-                                              <a:cs typeface="Times New Roman" panose="02020603050405020304" pitchFamily="18" charset="0"/>
-                                            </a:rPr>
-                                            <m:t>b</m:t>
-                                          </m:r>
-                                        </m:den>
-                                      </m:f>
-                                      <m:nary>
-                                        <m:naryPr>
-                                          <m:chr m:val="∑"/>
-                                          <m:supHide m:val="on"/>
-                                          <m:ctrlPr>
-                                            <a:rPr lang="en-US" altLang="ja-JP" sz="2400" i="1">
-                                              <a:latin typeface="Cambria Math" panose="02040503050406030204" pitchFamily="18" charset="0"/>
-                                              <a:ea typeface="Cambria Math" panose="02040503050406030204" pitchFamily="18" charset="0"/>
-                                            </a:rPr>
-                                          </m:ctrlPr>
-                                        </m:naryPr>
-                                        <m:sub>
-                                          <m:r>
-                                            <m:rPr>
-                                              <m:nor/>
-                                            </m:rPr>
-                                            <a:rPr lang="en-US" altLang="ja-JP" sz="2400" i="1">
-                                              <a:latin typeface="Times New Roman" panose="02020603050405020304" pitchFamily="18" charset="0"/>
-                                              <a:ea typeface="Cambria Math" panose="02040503050406030204" pitchFamily="18" charset="0"/>
-                                              <a:cs typeface="Times New Roman" panose="02020603050405020304" pitchFamily="18" charset="0"/>
-                                            </a:rPr>
-                                            <m:t>x</m:t>
-                                          </m:r>
-                                          <m:r>
-                                            <m:rPr>
-                                              <m:nor/>
-                                            </m:rPr>
-                                            <a:rPr lang="en-US" altLang="ja-JP" sz="2400" i="1" baseline="-25000">
-                                              <a:latin typeface="Times New Roman" panose="02020603050405020304" pitchFamily="18" charset="0"/>
-                                              <a:ea typeface="Cambria Math" panose="02040503050406030204" pitchFamily="18" charset="0"/>
-                                              <a:cs typeface="Times New Roman" panose="02020603050405020304" pitchFamily="18" charset="0"/>
-                                            </a:rPr>
-                                            <m:t>i</m:t>
-                                          </m:r>
-                                          <m:r>
-                                            <m:rPr>
-                                              <m:nor/>
-                                            </m:rPr>
-                                            <a:rPr lang="en-US" altLang="ja-JP" sz="2400">
-                                              <a:latin typeface="Times New Roman" panose="02020603050405020304" pitchFamily="18" charset="0"/>
-                                              <a:ea typeface="Cambria Math" panose="02040503050406030204" pitchFamily="18" charset="0"/>
-                                              <a:cs typeface="Times New Roman" panose="02020603050405020304" pitchFamily="18" charset="0"/>
-                                            </a:rPr>
-                                            <m:t>∈</m:t>
-                                          </m:r>
-                                          <m:r>
-                                            <m:rPr>
-                                              <m:nor/>
-                                            </m:rPr>
-                                            <a:rPr lang="en-US" altLang="ja-JP" sz="2400" i="1">
-                                              <a:latin typeface="Times New Roman" panose="02020603050405020304" pitchFamily="18" charset="0"/>
-                                              <a:ea typeface="Cambria Math" panose="02040503050406030204" pitchFamily="18" charset="0"/>
-                                              <a:cs typeface="Times New Roman" panose="02020603050405020304" pitchFamily="18" charset="0"/>
-                                            </a:rPr>
-                                            <m:t>B</m:t>
-                                          </m:r>
-                                          <m:r>
-                                            <m:rPr>
-                                              <m:nor/>
-                                            </m:rPr>
-                                            <a:rPr lang="en-US" altLang="ja-JP" sz="2400" i="1" baseline="-25000">
-                                              <a:latin typeface="Times New Roman" panose="02020603050405020304" pitchFamily="18" charset="0"/>
-                                              <a:ea typeface="Cambria Math" panose="02040503050406030204" pitchFamily="18" charset="0"/>
-                                              <a:cs typeface="Times New Roman" panose="02020603050405020304" pitchFamily="18" charset="0"/>
-                                            </a:rPr>
-                                            <m:t>r</m:t>
-                                          </m:r>
-                                        </m:sub>
-                                        <m:sup/>
-                                        <m:e>
-                                          <m:r>
-                                            <m:rPr>
-                                              <m:nor/>
-                                            </m:rPr>
-                                            <a:rPr lang="en-US" altLang="ja-JP" sz="2400" i="1">
-                                              <a:latin typeface="Times New Roman" panose="02020603050405020304" pitchFamily="18" charset="0"/>
-                                              <a:ea typeface="Cambria Math" panose="02040503050406030204" pitchFamily="18" charset="0"/>
-                                              <a:cs typeface="Times New Roman" panose="02020603050405020304" pitchFamily="18" charset="0"/>
-                                            </a:rPr>
-                                            <m:t>g</m:t>
-                                          </m:r>
-                                          <m:r>
-                                            <m:rPr>
-                                              <m:nor/>
-                                            </m:rPr>
-                                            <a:rPr lang="en-US" altLang="ja-JP" sz="2400" i="1" baseline="-25000">
-                                              <a:latin typeface="Times New Roman" panose="02020603050405020304" pitchFamily="18" charset="0"/>
-                                              <a:ea typeface="Cambria Math" panose="02040503050406030204" pitchFamily="18" charset="0"/>
-                                              <a:cs typeface="Times New Roman" panose="02020603050405020304" pitchFamily="18" charset="0"/>
-                                            </a:rPr>
-                                            <m:t>i</m:t>
-                                          </m:r>
-                                        </m:e>
-                                      </m:nary>
-                                    </m:e>
-                                  </m:nary>
-                                  <m:r>
-                                    <m:rPr>
-                                      <m:nor/>
-                                    </m:rPr>
-                                    <a:rPr lang="en-US" altLang="ja-JP" sz="2400" i="1">
-                                      <a:latin typeface="Times New Roman" panose="02020603050405020304" pitchFamily="18" charset="0"/>
-                                      <a:ea typeface="Cambria Math" panose="02040503050406030204" pitchFamily="18" charset="0"/>
-                                      <a:cs typeface="Times New Roman" panose="02020603050405020304" pitchFamily="18" charset="0"/>
-                                    </a:rPr>
-                                    <m:t> </m:t>
-                                  </m:r>
-                                </m:e>
-                              </m:d>
-                              <m:r>
-                                <m:rPr>
-                                  <m:nor/>
-                                </m:rPr>
-                                <a:rPr lang="en-US" altLang="ja-JP" sz="2400" i="1" baseline="30000">
-                                  <a:latin typeface="Times New Roman" panose="02020603050405020304" pitchFamily="18" charset="0"/>
-                                  <a:ea typeface="Cambria Math" panose="02040503050406030204" pitchFamily="18" charset="0"/>
-                                  <a:cs typeface="Times New Roman" panose="02020603050405020304" pitchFamily="18" charset="0"/>
-                                </a:rPr>
-                                <m:t>2</m:t>
-                              </m:r>
-                            </m:num>
-                            <m:den>
-                              <m:sSubSup>
-                                <m:sSubSupPr>
-                                  <m:ctrlPr>
-                                    <a:rPr lang="en-US" altLang="ja-JP" sz="2400" i="1">
-                                      <a:latin typeface="Cambria Math" panose="02040503050406030204" pitchFamily="18" charset="0"/>
-                                      <a:ea typeface="Cambria Math" panose="02040503050406030204" pitchFamily="18" charset="0"/>
-                                      <a:cs typeface="Times New Roman" panose="02020603050405020304" pitchFamily="18" charset="0"/>
-                                    </a:rPr>
-                                  </m:ctrlPr>
-                                </m:sSubSupPr>
-                                <m:e>
-                                  <m:r>
-                                    <m:rPr>
-                                      <m:nor/>
-                                    </m:rPr>
-                                    <a:rPr lang="en-US" altLang="ja-JP" sz="2400" i="1">
-                                      <a:latin typeface="Times New Roman" panose="02020603050405020304" pitchFamily="18" charset="0"/>
-                                      <a:ea typeface="Cambria Math" panose="02040503050406030204" pitchFamily="18" charset="0"/>
-                                      <a:cs typeface="Times New Roman" panose="02020603050405020304" pitchFamily="18" charset="0"/>
-                                    </a:rPr>
-                                    <m:t>n</m:t>
-                                  </m:r>
-                                </m:e>
-                                <m:sub>
-                                  <m:r>
-                                    <m:rPr>
-                                      <m:nor/>
-                                    </m:rPr>
-                                    <a:rPr lang="en-US" altLang="ja-JP" sz="2400" i="1">
-                                      <a:latin typeface="Times New Roman" panose="02020603050405020304" pitchFamily="18" charset="0"/>
-                                      <a:ea typeface="Cambria Math" panose="02040503050406030204" pitchFamily="18" charset="0"/>
-                                      <a:cs typeface="Times New Roman" panose="02020603050405020304" pitchFamily="18" charset="0"/>
-                                    </a:rPr>
-                                    <m:t>i</m:t>
-                                  </m:r>
-                                </m:sub>
-                                <m:sup>
-                                  <m:r>
-                                    <m:rPr>
-                                      <m:nor/>
-                                    </m:rPr>
-                                    <a:rPr lang="en-US" altLang="ja-JP" sz="2400" i="1">
-                                      <a:latin typeface="Times New Roman" panose="02020603050405020304" pitchFamily="18" charset="0"/>
-                                      <a:ea typeface="Cambria Math" panose="02040503050406030204" pitchFamily="18" charset="0"/>
-                                      <a:cs typeface="Times New Roman" panose="02020603050405020304" pitchFamily="18" charset="0"/>
-                                    </a:rPr>
-                                    <m:t>j</m:t>
-                                  </m:r>
-                                </m:sup>
-                              </m:sSubSup>
-                              <m:r>
-                                <m:rPr>
-                                  <m:nor/>
-                                </m:rPr>
-                                <a:rPr lang="en-US" altLang="ja-JP" sz="2400">
-                                  <a:latin typeface="Times New Roman" panose="02020603050405020304" pitchFamily="18" charset="0"/>
-                                  <a:ea typeface="Cambria Math" panose="02040503050406030204" pitchFamily="18" charset="0"/>
-                                  <a:cs typeface="Times New Roman" panose="02020603050405020304" pitchFamily="18" charset="0"/>
-                                </a:rPr>
-                                <m:t>(</m:t>
-                              </m:r>
-                              <m:r>
-                                <m:rPr>
-                                  <m:nor/>
-                                </m:rPr>
-                                <a:rPr lang="en-US" altLang="ja-JP" sz="2400" i="1">
-                                  <a:latin typeface="Times New Roman" panose="02020603050405020304" pitchFamily="18" charset="0"/>
-                                  <a:ea typeface="Cambria Math" panose="02040503050406030204" pitchFamily="18" charset="0"/>
-                                  <a:cs typeface="Times New Roman" panose="02020603050405020304" pitchFamily="18" charset="0"/>
-                                </a:rPr>
-                                <m:t>d</m:t>
-                              </m:r>
-                              <m:r>
-                                <m:rPr>
-                                  <m:nor/>
-                                </m:rPr>
-                                <a:rPr lang="en-US" altLang="ja-JP" sz="2400">
-                                  <a:latin typeface="Times New Roman" panose="02020603050405020304" pitchFamily="18" charset="0"/>
-                                  <a:ea typeface="Cambria Math" panose="02040503050406030204" pitchFamily="18" charset="0"/>
-                                  <a:cs typeface="Times New Roman" panose="02020603050405020304" pitchFamily="18" charset="0"/>
-                                </a:rPr>
-                                <m:t>)</m:t>
-                              </m:r>
-                            </m:den>
-                          </m:f>
-                        </m:e>
-                      </m:d>
-                    </m:oMath>
-                  </m:oMathPara>
-                </a14:m>
-                <a:endParaRPr kumimoji="1" lang="ja-JP" altLang="en-US" i="1" dirty="0">
-                  <a:latin typeface="Times New Roman" panose="02020603050405020304" pitchFamily="18" charset="0"/>
-                  <a:cs typeface="Times New Roman" panose="02020603050405020304" pitchFamily="18" charset="0"/>
-                </a:endParaRPr>
-              </a:p>
-            </p:txBody>
-          </p:sp>
-        </mc:Choice>
-        <mc:Fallback>
-          <p:sp>
-            <p:nvSpPr>
-              <p:cNvPr id="3" name="コンテンツ プレースホルダー 2"/>
-              <p:cNvSpPr>
-                <a:spLocks noGrp="1" noRot="1" noChangeAspect="1" noMove="1" noResize="1" noEditPoints="1" noAdjustHandles="1" noChangeArrowheads="1" noChangeShapeType="1" noTextEdit="1"/>
-              </p:cNvSpPr>
-              <p:nvPr>
-                <p:ph idx="1"/>
-              </p:nvPr>
-            </p:nvSpPr>
-            <p:spPr>
-              <a:blipFill>
-                <a:blip r:embed="rId2"/>
-                <a:stretch>
-                  <a:fillRect l="-1825" t="-1882" r="-1754" b="-3882"/>
-                </a:stretch>
-              </a:blipFill>
-            </p:spPr>
-            <p:txBody>
-              <a:bodyPr/>
-              <a:lstStyle/>
-              <a:p>
-                <a:r>
-                  <a:rPr lang="ja-JP" altLang="en-US">
-                    <a:noFill/>
-                  </a:rPr>
-                  <a:t> </a:t>
-                </a:r>
-              </a:p>
-            </p:txBody>
-          </p:sp>
-        </mc:Fallback>
-      </mc:AlternateContent>
+      <p:sp>
+        <p:nvSpPr>
+          <p:cNvPr id="3" name="コンテンツ プレースホルダー 2"/>
+          <p:cNvSpPr>
+            <a:spLocks noGrp="1"/>
+          </p:cNvSpPr>
+          <p:nvPr>
+            <p:ph idx="1"/>
+          </p:nvPr>
+        </p:nvSpPr>
+        <p:spPr/>
+        <p:txBody>
+          <a:bodyPr/>
+          <a:lstStyle/>
+          <a:p>
+            <a:r>
+              <a:rPr lang="ja-JP" altLang="en-US" dirty="0" smtClean="0"/>
+              <a:t>弱識別</a:t>
+            </a:r>
+            <a:r>
+              <a:rPr lang="ja-JP" altLang="en-US" dirty="0"/>
+              <a:t>器</a:t>
+            </a:r>
+            <a:r>
+              <a:rPr lang="ja-JP" altLang="en-US" dirty="0" smtClean="0"/>
+              <a:t>を追加する際，勾配が大きいデータに</a:t>
+            </a:r>
+            <a:r>
+              <a:rPr lang="en-US" altLang="ja-JP" dirty="0" smtClean="0"/>
+              <a:t/>
+            </a:r>
+            <a:br>
+              <a:rPr lang="en-US" altLang="ja-JP" dirty="0" smtClean="0"/>
+            </a:br>
+            <a:r>
+              <a:rPr lang="ja-JP" altLang="en-US" dirty="0" smtClean="0"/>
+              <a:t>対して適応することが重要である．</a:t>
+            </a:r>
+            <a:endParaRPr lang="en-US" altLang="ja-JP" dirty="0" smtClean="0"/>
+          </a:p>
+          <a:p>
+            <a:r>
+              <a:rPr kumimoji="1" lang="ja-JP" altLang="en-US" dirty="0" smtClean="0"/>
+              <a:t>勾配の上位</a:t>
+            </a:r>
+            <a:r>
+              <a:rPr kumimoji="1" lang="en-US" altLang="ja-JP" i="1" dirty="0" smtClean="0">
+                <a:latin typeface="Times New Roman" panose="02020603050405020304" pitchFamily="18" charset="0"/>
+                <a:cs typeface="Times New Roman" panose="02020603050405020304" pitchFamily="18" charset="0"/>
+              </a:rPr>
+              <a:t>a</a:t>
+            </a:r>
+            <a:r>
+              <a:rPr kumimoji="1" lang="en-US" altLang="ja-JP" dirty="0" smtClean="0">
+                <a:cs typeface="Times New Roman" panose="02020603050405020304" pitchFamily="18" charset="0"/>
+              </a:rPr>
+              <a:t>×100</a:t>
+            </a:r>
+            <a:r>
+              <a:rPr kumimoji="1" lang="en-US" altLang="ja-JP" dirty="0" smtClean="0"/>
+              <a:t>%</a:t>
+            </a:r>
+            <a:r>
+              <a:rPr kumimoji="1" lang="ja-JP" altLang="en-US" dirty="0" smtClean="0"/>
+              <a:t>のデータはすべて使用し，残りのデータ</a:t>
+            </a:r>
+            <a:r>
+              <a:rPr lang="ja-JP" altLang="en-US" dirty="0" smtClean="0"/>
+              <a:t>は，</a:t>
+            </a:r>
+            <a:r>
+              <a:rPr kumimoji="1" lang="en-US" altLang="ja-JP" i="1" dirty="0" smtClean="0">
+                <a:latin typeface="Times New Roman" panose="02020603050405020304" pitchFamily="18" charset="0"/>
+                <a:cs typeface="Times New Roman" panose="02020603050405020304" pitchFamily="18" charset="0"/>
+              </a:rPr>
+              <a:t>b</a:t>
+            </a:r>
+            <a:r>
+              <a:rPr kumimoji="1" lang="en-US" altLang="ja-JP" dirty="0" smtClean="0">
+                <a:cs typeface="Times New Roman" panose="02020603050405020304" pitchFamily="18" charset="0"/>
+              </a:rPr>
+              <a:t>×100</a:t>
+            </a:r>
+            <a:r>
+              <a:rPr kumimoji="1" lang="en-US" altLang="ja-JP" dirty="0" smtClean="0"/>
+              <a:t>%</a:t>
+            </a:r>
+            <a:r>
+              <a:rPr kumimoji="1" lang="ja-JP" altLang="en-US" dirty="0" smtClean="0"/>
+              <a:t>をランダムサンプリングする．</a:t>
+            </a:r>
+            <a:endParaRPr kumimoji="1" lang="en-US" altLang="ja-JP" dirty="0" smtClean="0"/>
+          </a:p>
+          <a:p>
+            <a:endParaRPr kumimoji="1" lang="ja-JP" altLang="en-US" sz="2800" i="1" dirty="0">
+              <a:latin typeface="Times New Roman" panose="02020603050405020304" pitchFamily="18" charset="0"/>
+              <a:cs typeface="Times New Roman" panose="02020603050405020304" pitchFamily="18" charset="0"/>
+            </a:endParaRPr>
+          </a:p>
+        </p:txBody>
+      </p:sp>
       <p:sp>
         <p:nvSpPr>
           <p:cNvPr id="4" name="スライド番号プレースホルダー 3"/>
@@ -3451,6 +2496,1947 @@
         <p:cTn id="1" dur="indefinite" restart="never" nodeType="tmRoot"/>
       </p:par>
     </p:tnLst>
+  </p:timing>
+</p:sld>
+</file>
+
+<file path=ppt/slides/slide2.xml><?xml version="1.0" encoding="utf-8"?>
+<p:sld xmlns:a="http://schemas.openxmlformats.org/drawingml/2006/main" xmlns:r="http://schemas.openxmlformats.org/officeDocument/2006/relationships" xmlns:p="http://schemas.openxmlformats.org/presentationml/2006/main">
+  <p:cSld>
+    <p:spTree>
+      <p:nvGrpSpPr>
+        <p:cNvPr id="1" name=""/>
+        <p:cNvGrpSpPr/>
+        <p:nvPr/>
+      </p:nvGrpSpPr>
+      <p:grpSpPr>
+        <a:xfrm>
+          <a:off x="0" y="0"/>
+          <a:ext cx="0" cy="0"/>
+          <a:chOff x="0" y="0"/>
+          <a:chExt cx="0" cy="0"/>
+        </a:xfrm>
+      </p:grpSpPr>
+      <p:sp>
+        <p:nvSpPr>
+          <p:cNvPr id="2" name="タイトル 1"/>
+          <p:cNvSpPr>
+            <a:spLocks noGrp="1"/>
+          </p:cNvSpPr>
+          <p:nvPr>
+            <p:ph type="title"/>
+          </p:nvPr>
+        </p:nvSpPr>
+        <p:spPr/>
+        <p:txBody>
+          <a:bodyPr/>
+          <a:lstStyle/>
+          <a:p>
+            <a:r>
+              <a:rPr lang="en-US" altLang="ja-JP" sz="3800" dirty="0"/>
+              <a:t>Gradient-based One-Side Sampling</a:t>
+            </a:r>
+            <a:endParaRPr kumimoji="1" lang="ja-JP" altLang="en-US" sz="3800" dirty="0"/>
+          </a:p>
+        </p:txBody>
+      </p:sp>
+      <mc:AlternateContent xmlns:mc="http://schemas.openxmlformats.org/markup-compatibility/2006">
+        <mc:Choice xmlns:a14="http://schemas.microsoft.com/office/drawing/2010/main" Requires="a14">
+          <p:sp>
+            <p:nvSpPr>
+              <p:cNvPr id="3" name="コンテンツ プレースホルダー 2"/>
+              <p:cNvSpPr>
+                <a:spLocks noGrp="1"/>
+              </p:cNvSpPr>
+              <p:nvPr>
+                <p:ph idx="1"/>
+              </p:nvPr>
+            </p:nvSpPr>
+            <p:spPr/>
+            <p:txBody>
+              <a:bodyPr/>
+              <a:lstStyle/>
+              <a:p>
+                <a:r>
+                  <a:rPr lang="ja-JP" altLang="en-US" dirty="0" smtClean="0"/>
+                  <a:t>近似情報ゲイン</a:t>
+                </a:r>
+                <a:r>
+                  <a:rPr lang="en-US" altLang="ja-JP" dirty="0" smtClean="0"/>
+                  <a:t>(</a:t>
+                </a:r>
+                <a:r>
+                  <a:rPr lang="ja-JP" altLang="en-US" dirty="0" smtClean="0"/>
+                  <a:t>分散ゲイン</a:t>
+                </a:r>
+                <a:r>
+                  <a:rPr lang="en-US" altLang="ja-JP" dirty="0" smtClean="0"/>
+                  <a:t>)</a:t>
+                </a:r>
+                <a:r>
+                  <a:rPr lang="ja-JP" altLang="en-US" dirty="0" smtClean="0"/>
+                  <a:t>を以下のように定義</a:t>
+                </a:r>
+                <a:endParaRPr lang="en-US" altLang="ja-JP" dirty="0" smtClean="0"/>
+              </a:p>
+              <a:p>
+                <a:endParaRPr lang="en-US" altLang="ja-JP" dirty="0" smtClean="0"/>
+              </a:p>
+              <a:p>
+                <a:pPr/>
+                <a14:m>
+                  <m:oMathPara xmlns:m="http://schemas.openxmlformats.org/officeDocument/2006/math">
+                    <m:oMathParaPr>
+                      <m:jc m:val="left"/>
+                    </m:oMathParaPr>
+                    <m:oMath xmlns:m="http://schemas.openxmlformats.org/officeDocument/2006/math">
+                      <m:acc>
+                        <m:accPr>
+                          <m:chr m:val="̃"/>
+                          <m:ctrlPr>
+                            <a:rPr kumimoji="1" lang="en-US" altLang="ja-JP" sz="2800" b="0" i="1" smtClean="0">
+                              <a:latin typeface="Cambria Math" panose="02040503050406030204" pitchFamily="18" charset="0"/>
+                              <a:cs typeface="Times New Roman" panose="02020603050405020304" pitchFamily="18" charset="0"/>
+                            </a:rPr>
+                          </m:ctrlPr>
+                        </m:accPr>
+                        <m:e>
+                          <m:r>
+                            <m:rPr>
+                              <m:nor/>
+                            </m:rPr>
+                            <a:rPr kumimoji="1" lang="en-US" altLang="ja-JP" sz="2800" b="0" i="1" smtClean="0">
+                              <a:latin typeface="Times New Roman" panose="02020603050405020304" pitchFamily="18" charset="0"/>
+                              <a:cs typeface="Times New Roman" panose="02020603050405020304" pitchFamily="18" charset="0"/>
+                            </a:rPr>
+                            <m:t>V</m:t>
+                          </m:r>
+                        </m:e>
+                      </m:acc>
+                      <m:r>
+                        <m:rPr>
+                          <m:nor/>
+                        </m:rPr>
+                        <a:rPr kumimoji="1" lang="en-US" altLang="ja-JP" sz="2800" b="0" i="1" baseline="-25000" smtClean="0">
+                          <a:latin typeface="Times New Roman" panose="02020603050405020304" pitchFamily="18" charset="0"/>
+                          <a:cs typeface="Times New Roman" panose="02020603050405020304" pitchFamily="18" charset="0"/>
+                        </a:rPr>
+                        <m:t>j</m:t>
+                      </m:r>
+                      <m:d>
+                        <m:dPr>
+                          <m:ctrlPr>
+                            <a:rPr kumimoji="1" lang="en-US" altLang="ja-JP" sz="2800" b="0" i="1" smtClean="0">
+                              <a:latin typeface="Cambria Math" panose="02040503050406030204" pitchFamily="18" charset="0"/>
+                            </a:rPr>
+                          </m:ctrlPr>
+                        </m:dPr>
+                        <m:e>
+                          <m:r>
+                            <m:rPr>
+                              <m:nor/>
+                            </m:rPr>
+                            <a:rPr kumimoji="1" lang="en-US" altLang="ja-JP" sz="2800" b="0" i="1" smtClean="0">
+                              <a:latin typeface="Times New Roman" panose="02020603050405020304" pitchFamily="18" charset="0"/>
+                              <a:cs typeface="Times New Roman" panose="02020603050405020304" pitchFamily="18" charset="0"/>
+                            </a:rPr>
+                            <m:t>d</m:t>
+                          </m:r>
+                        </m:e>
+                      </m:d>
+                      <m:r>
+                        <a:rPr kumimoji="1" lang="en-US" altLang="ja-JP" sz="2800" b="0" i="1" smtClean="0">
+                          <a:latin typeface="Cambria Math" panose="02040503050406030204" pitchFamily="18" charset="0"/>
+                          <a:cs typeface="Times New Roman" panose="02020603050405020304" pitchFamily="18" charset="0"/>
+                        </a:rPr>
+                        <m:t> </m:t>
+                      </m:r>
+                      <m:r>
+                        <m:rPr>
+                          <m:nor/>
+                        </m:rPr>
+                        <a:rPr kumimoji="1" lang="en-US" altLang="ja-JP" sz="2800" b="0" i="1" smtClean="0">
+                          <a:latin typeface="Times New Roman" panose="02020603050405020304" pitchFamily="18" charset="0"/>
+                          <a:cs typeface="Times New Roman" panose="02020603050405020304" pitchFamily="18" charset="0"/>
+                        </a:rPr>
+                        <m:t>=</m:t>
+                      </m:r>
+                      <m:r>
+                        <a:rPr kumimoji="1" lang="en-US" altLang="ja-JP" sz="2800" b="0" i="1" smtClean="0">
+                          <a:latin typeface="Cambria Math" panose="02040503050406030204" pitchFamily="18" charset="0"/>
+                          <a:cs typeface="Times New Roman" panose="02020603050405020304" pitchFamily="18" charset="0"/>
+                        </a:rPr>
+                        <m:t> </m:t>
+                      </m:r>
+                      <m:f>
+                        <m:fPr>
+                          <m:ctrlPr>
+                            <a:rPr kumimoji="1" lang="en-US" altLang="ja-JP" sz="2800" b="0" i="1" smtClean="0">
+                              <a:latin typeface="Cambria Math" panose="02040503050406030204" pitchFamily="18" charset="0"/>
+                            </a:rPr>
+                          </m:ctrlPr>
+                        </m:fPr>
+                        <m:num>
+                          <m:r>
+                            <m:rPr>
+                              <m:nor/>
+                            </m:rPr>
+                            <a:rPr kumimoji="1" lang="en-US" altLang="ja-JP" sz="2800" b="0" smtClean="0">
+                              <a:latin typeface="Times New Roman" panose="02020603050405020304" pitchFamily="18" charset="0"/>
+                              <a:cs typeface="Times New Roman" panose="02020603050405020304" pitchFamily="18" charset="0"/>
+                            </a:rPr>
+                            <m:t>1</m:t>
+                          </m:r>
+                        </m:num>
+                        <m:den>
+                          <m:r>
+                            <m:rPr>
+                              <m:nor/>
+                            </m:rPr>
+                            <a:rPr kumimoji="1" lang="en-US" altLang="ja-JP" sz="2800" b="0" i="1" smtClean="0">
+                              <a:latin typeface="Times New Roman" panose="02020603050405020304" pitchFamily="18" charset="0"/>
+                              <a:cs typeface="Times New Roman" panose="02020603050405020304" pitchFamily="18" charset="0"/>
+                            </a:rPr>
+                            <m:t>n</m:t>
+                          </m:r>
+                        </m:den>
+                      </m:f>
+                      <m:d>
+                        <m:dPr>
+                          <m:ctrlPr>
+                            <a:rPr kumimoji="1" lang="en-US" altLang="ja-JP" sz="2800" b="0" i="1" smtClean="0">
+                              <a:latin typeface="Cambria Math" panose="02040503050406030204" pitchFamily="18" charset="0"/>
+                            </a:rPr>
+                          </m:ctrlPr>
+                        </m:dPr>
+                        <m:e>
+                          <m:f>
+                            <m:fPr>
+                              <m:ctrlPr>
+                                <a:rPr lang="en-US" altLang="ja-JP" sz="2800" i="1">
+                                  <a:latin typeface="Cambria Math" panose="02040503050406030204" pitchFamily="18" charset="0"/>
+                                </a:rPr>
+                              </m:ctrlPr>
+                            </m:fPr>
+                            <m:num>
+                              <m:d>
+                                <m:dPr>
+                                  <m:ctrlPr>
+                                    <a:rPr lang="en-US" altLang="ja-JP" sz="2800" i="1">
+                                      <a:latin typeface="Cambria Math" panose="02040503050406030204" pitchFamily="18" charset="0"/>
+                                    </a:rPr>
+                                  </m:ctrlPr>
+                                </m:dPr>
+                                <m:e>
+                                  <m:nary>
+                                    <m:naryPr>
+                                      <m:chr m:val="∑"/>
+                                      <m:supHide m:val="on"/>
+                                      <m:ctrlPr>
+                                        <a:rPr lang="en-US" altLang="ja-JP" sz="2800" i="1">
+                                          <a:latin typeface="Cambria Math" panose="02040503050406030204" pitchFamily="18" charset="0"/>
+                                        </a:rPr>
+                                      </m:ctrlPr>
+                                    </m:naryPr>
+                                    <m:sub>
+                                      <m:r>
+                                        <m:rPr>
+                                          <m:nor/>
+                                        </m:rPr>
+                                        <a:rPr lang="en-US" altLang="ja-JP" sz="2800" i="1">
+                                          <a:latin typeface="Times New Roman" panose="02020603050405020304" pitchFamily="18" charset="0"/>
+                                          <a:cs typeface="Times New Roman" panose="02020603050405020304" pitchFamily="18" charset="0"/>
+                                        </a:rPr>
+                                        <m:t>x</m:t>
+                                      </m:r>
+                                      <m:r>
+                                        <m:rPr>
+                                          <m:nor/>
+                                        </m:rPr>
+                                        <a:rPr lang="en-US" altLang="ja-JP" sz="2800" i="1" baseline="-25000">
+                                          <a:latin typeface="Times New Roman" panose="02020603050405020304" pitchFamily="18" charset="0"/>
+                                          <a:cs typeface="Times New Roman" panose="02020603050405020304" pitchFamily="18" charset="0"/>
+                                        </a:rPr>
+                                        <m:t>i</m:t>
+                                      </m:r>
+                                      <m:r>
+                                        <m:rPr>
+                                          <m:nor/>
+                                        </m:rPr>
+                                        <a:rPr lang="en-US" altLang="ja-JP" sz="2800">
+                                          <a:latin typeface="Times New Roman" panose="02020603050405020304" pitchFamily="18" charset="0"/>
+                                          <a:ea typeface="Cambria Math" panose="02040503050406030204" pitchFamily="18" charset="0"/>
+                                          <a:cs typeface="Times New Roman" panose="02020603050405020304" pitchFamily="18" charset="0"/>
+                                        </a:rPr>
+                                        <m:t>∈</m:t>
+                                      </m:r>
+                                      <m:r>
+                                        <m:rPr>
+                                          <m:nor/>
+                                        </m:rPr>
+                                        <a:rPr lang="en-US" altLang="ja-JP" sz="2800" i="1">
+                                          <a:latin typeface="Times New Roman" panose="02020603050405020304" pitchFamily="18" charset="0"/>
+                                          <a:ea typeface="Cambria Math" panose="02040503050406030204" pitchFamily="18" charset="0"/>
+                                          <a:cs typeface="Times New Roman" panose="02020603050405020304" pitchFamily="18" charset="0"/>
+                                        </a:rPr>
+                                        <m:t>A</m:t>
+                                      </m:r>
+                                      <m:r>
+                                        <m:rPr>
+                                          <m:nor/>
+                                        </m:rPr>
+                                        <a:rPr lang="en-US" altLang="ja-JP" sz="2800" i="1" baseline="-25000">
+                                          <a:latin typeface="Times New Roman" panose="02020603050405020304" pitchFamily="18" charset="0"/>
+                                          <a:ea typeface="Cambria Math" panose="02040503050406030204" pitchFamily="18" charset="0"/>
+                                          <a:cs typeface="Times New Roman" panose="02020603050405020304" pitchFamily="18" charset="0"/>
+                                        </a:rPr>
+                                        <m:t>l</m:t>
+                                      </m:r>
+                                    </m:sub>
+                                    <m:sup/>
+                                    <m:e>
+                                      <m:r>
+                                        <m:rPr>
+                                          <m:nor/>
+                                        </m:rPr>
+                                        <a:rPr lang="en-US" altLang="ja-JP" sz="2800" i="1">
+                                          <a:latin typeface="Times New Roman" panose="02020603050405020304" pitchFamily="18" charset="0"/>
+                                          <a:ea typeface="Cambria Math" panose="02040503050406030204" pitchFamily="18" charset="0"/>
+                                          <a:cs typeface="Times New Roman" panose="02020603050405020304" pitchFamily="18" charset="0"/>
+                                        </a:rPr>
+                                        <m:t>g</m:t>
+                                      </m:r>
+                                      <m:r>
+                                        <m:rPr>
+                                          <m:nor/>
+                                        </m:rPr>
+                                        <a:rPr lang="en-US" altLang="ja-JP" sz="2800" i="1" baseline="-25000">
+                                          <a:latin typeface="Times New Roman" panose="02020603050405020304" pitchFamily="18" charset="0"/>
+                                          <a:ea typeface="Cambria Math" panose="02040503050406030204" pitchFamily="18" charset="0"/>
+                                          <a:cs typeface="Times New Roman" panose="02020603050405020304" pitchFamily="18" charset="0"/>
+                                        </a:rPr>
+                                        <m:t>i</m:t>
+                                      </m:r>
+                                      <m:r>
+                                        <m:rPr>
+                                          <m:nor/>
+                                        </m:rPr>
+                                        <a:rPr lang="en-US" altLang="ja-JP" sz="2800" b="0" i="1" smtClean="0">
+                                          <a:latin typeface="Times New Roman" panose="02020603050405020304" pitchFamily="18" charset="0"/>
+                                          <a:ea typeface="Cambria Math" panose="02040503050406030204" pitchFamily="18" charset="0"/>
+                                          <a:cs typeface="Times New Roman" panose="02020603050405020304" pitchFamily="18" charset="0"/>
+                                        </a:rPr>
+                                        <m:t> +</m:t>
+                                      </m:r>
+                                      <m:f>
+                                        <m:fPr>
+                                          <m:ctrlPr>
+                                            <a:rPr lang="en-US" altLang="ja-JP" sz="2800" i="1">
+                                              <a:latin typeface="Cambria Math" panose="02040503050406030204" pitchFamily="18" charset="0"/>
+                                              <a:ea typeface="Cambria Math" panose="02040503050406030204" pitchFamily="18" charset="0"/>
+                                            </a:rPr>
+                                          </m:ctrlPr>
+                                        </m:fPr>
+                                        <m:num>
+                                          <m:r>
+                                            <m:rPr>
+                                              <m:nor/>
+                                            </m:rPr>
+                                            <a:rPr lang="en-US" altLang="ja-JP" sz="2800">
+                                              <a:latin typeface="Times New Roman" panose="02020603050405020304" pitchFamily="18" charset="0"/>
+                                              <a:ea typeface="Cambria Math" panose="02040503050406030204" pitchFamily="18" charset="0"/>
+                                              <a:cs typeface="Times New Roman" panose="02020603050405020304" pitchFamily="18" charset="0"/>
+                                            </a:rPr>
+                                            <m:t>1</m:t>
+                                          </m:r>
+                                          <m:r>
+                                            <m:rPr>
+                                              <m:nor/>
+                                            </m:rPr>
+                                            <a:rPr lang="en-US" altLang="ja-JP" sz="2800" i="1">
+                                              <a:latin typeface="Times New Roman" panose="02020603050405020304" pitchFamily="18" charset="0"/>
+                                              <a:ea typeface="Cambria Math" panose="02040503050406030204" pitchFamily="18" charset="0"/>
+                                              <a:cs typeface="Times New Roman" panose="02020603050405020304" pitchFamily="18" charset="0"/>
+                                            </a:rPr>
+                                            <m:t>−</m:t>
+                                          </m:r>
+                                          <m:r>
+                                            <m:rPr>
+                                              <m:nor/>
+                                            </m:rPr>
+                                            <a:rPr lang="en-US" altLang="ja-JP" sz="2800" i="1">
+                                              <a:latin typeface="Times New Roman" panose="02020603050405020304" pitchFamily="18" charset="0"/>
+                                              <a:ea typeface="Cambria Math" panose="02040503050406030204" pitchFamily="18" charset="0"/>
+                                              <a:cs typeface="Times New Roman" panose="02020603050405020304" pitchFamily="18" charset="0"/>
+                                            </a:rPr>
+                                            <m:t>a</m:t>
+                                          </m:r>
+                                        </m:num>
+                                        <m:den>
+                                          <m:r>
+                                            <m:rPr>
+                                              <m:nor/>
+                                            </m:rPr>
+                                            <a:rPr lang="en-US" altLang="ja-JP" sz="2800" i="1">
+                                              <a:latin typeface="Times New Roman" panose="02020603050405020304" pitchFamily="18" charset="0"/>
+                                              <a:ea typeface="Cambria Math" panose="02040503050406030204" pitchFamily="18" charset="0"/>
+                                              <a:cs typeface="Times New Roman" panose="02020603050405020304" pitchFamily="18" charset="0"/>
+                                            </a:rPr>
+                                            <m:t>b</m:t>
+                                          </m:r>
+                                        </m:den>
+                                      </m:f>
+                                      <m:nary>
+                                        <m:naryPr>
+                                          <m:chr m:val="∑"/>
+                                          <m:supHide m:val="on"/>
+                                          <m:ctrlPr>
+                                            <a:rPr lang="en-US" altLang="ja-JP" sz="2800" i="1">
+                                              <a:latin typeface="Cambria Math" panose="02040503050406030204" pitchFamily="18" charset="0"/>
+                                              <a:ea typeface="Cambria Math" panose="02040503050406030204" pitchFamily="18" charset="0"/>
+                                            </a:rPr>
+                                          </m:ctrlPr>
+                                        </m:naryPr>
+                                        <m:sub>
+                                          <m:r>
+                                            <m:rPr>
+                                              <m:nor/>
+                                            </m:rPr>
+                                            <a:rPr lang="en-US" altLang="ja-JP" sz="2800" i="1">
+                                              <a:latin typeface="Times New Roman" panose="02020603050405020304" pitchFamily="18" charset="0"/>
+                                              <a:ea typeface="Cambria Math" panose="02040503050406030204" pitchFamily="18" charset="0"/>
+                                              <a:cs typeface="Times New Roman" panose="02020603050405020304" pitchFamily="18" charset="0"/>
+                                            </a:rPr>
+                                            <m:t>x</m:t>
+                                          </m:r>
+                                          <m:r>
+                                            <m:rPr>
+                                              <m:nor/>
+                                            </m:rPr>
+                                            <a:rPr lang="en-US" altLang="ja-JP" sz="2800" i="1" baseline="-25000">
+                                              <a:latin typeface="Times New Roman" panose="02020603050405020304" pitchFamily="18" charset="0"/>
+                                              <a:ea typeface="Cambria Math" panose="02040503050406030204" pitchFamily="18" charset="0"/>
+                                              <a:cs typeface="Times New Roman" panose="02020603050405020304" pitchFamily="18" charset="0"/>
+                                            </a:rPr>
+                                            <m:t>i</m:t>
+                                          </m:r>
+                                          <m:r>
+                                            <m:rPr>
+                                              <m:nor/>
+                                            </m:rPr>
+                                            <a:rPr lang="en-US" altLang="ja-JP" sz="2800">
+                                              <a:latin typeface="Times New Roman" panose="02020603050405020304" pitchFamily="18" charset="0"/>
+                                              <a:ea typeface="Cambria Math" panose="02040503050406030204" pitchFamily="18" charset="0"/>
+                                              <a:cs typeface="Times New Roman" panose="02020603050405020304" pitchFamily="18" charset="0"/>
+                                            </a:rPr>
+                                            <m:t>∈</m:t>
+                                          </m:r>
+                                          <m:r>
+                                            <m:rPr>
+                                              <m:nor/>
+                                            </m:rPr>
+                                            <a:rPr lang="en-US" altLang="ja-JP" sz="2800" i="1">
+                                              <a:latin typeface="Times New Roman" panose="02020603050405020304" pitchFamily="18" charset="0"/>
+                                              <a:ea typeface="Cambria Math" panose="02040503050406030204" pitchFamily="18" charset="0"/>
+                                              <a:cs typeface="Times New Roman" panose="02020603050405020304" pitchFamily="18" charset="0"/>
+                                            </a:rPr>
+                                            <m:t>B</m:t>
+                                          </m:r>
+                                          <m:r>
+                                            <m:rPr>
+                                              <m:nor/>
+                                            </m:rPr>
+                                            <a:rPr lang="en-US" altLang="ja-JP" sz="2800" i="1" baseline="-25000">
+                                              <a:latin typeface="Times New Roman" panose="02020603050405020304" pitchFamily="18" charset="0"/>
+                                              <a:ea typeface="Cambria Math" panose="02040503050406030204" pitchFamily="18" charset="0"/>
+                                              <a:cs typeface="Times New Roman" panose="02020603050405020304" pitchFamily="18" charset="0"/>
+                                            </a:rPr>
+                                            <m:t>l</m:t>
+                                          </m:r>
+                                        </m:sub>
+                                        <m:sup/>
+                                        <m:e>
+                                          <m:r>
+                                            <m:rPr>
+                                              <m:nor/>
+                                            </m:rPr>
+                                            <a:rPr lang="en-US" altLang="ja-JP" sz="2800" i="1">
+                                              <a:latin typeface="Times New Roman" panose="02020603050405020304" pitchFamily="18" charset="0"/>
+                                              <a:ea typeface="Cambria Math" panose="02040503050406030204" pitchFamily="18" charset="0"/>
+                                              <a:cs typeface="Times New Roman" panose="02020603050405020304" pitchFamily="18" charset="0"/>
+                                            </a:rPr>
+                                            <m:t>g</m:t>
+                                          </m:r>
+                                          <m:r>
+                                            <m:rPr>
+                                              <m:nor/>
+                                            </m:rPr>
+                                            <a:rPr lang="en-US" altLang="ja-JP" sz="2800" i="1" baseline="-25000">
+                                              <a:latin typeface="Times New Roman" panose="02020603050405020304" pitchFamily="18" charset="0"/>
+                                              <a:ea typeface="Cambria Math" panose="02040503050406030204" pitchFamily="18" charset="0"/>
+                                              <a:cs typeface="Times New Roman" panose="02020603050405020304" pitchFamily="18" charset="0"/>
+                                            </a:rPr>
+                                            <m:t>i</m:t>
+                                          </m:r>
+                                        </m:e>
+                                      </m:nary>
+                                    </m:e>
+                                  </m:nary>
+                                  <m:r>
+                                    <m:rPr>
+                                      <m:nor/>
+                                    </m:rPr>
+                                    <a:rPr lang="en-US" altLang="ja-JP" sz="2800" i="1">
+                                      <a:latin typeface="Times New Roman" panose="02020603050405020304" pitchFamily="18" charset="0"/>
+                                      <a:ea typeface="Cambria Math" panose="02040503050406030204" pitchFamily="18" charset="0"/>
+                                      <a:cs typeface="Times New Roman" panose="02020603050405020304" pitchFamily="18" charset="0"/>
+                                    </a:rPr>
+                                    <m:t> </m:t>
+                                  </m:r>
+                                </m:e>
+                              </m:d>
+                              <m:r>
+                                <m:rPr>
+                                  <m:nor/>
+                                </m:rPr>
+                                <a:rPr lang="en-US" altLang="ja-JP" sz="2800" baseline="30000">
+                                  <a:latin typeface="Times New Roman" panose="02020603050405020304" pitchFamily="18" charset="0"/>
+                                  <a:ea typeface="Cambria Math" panose="02040503050406030204" pitchFamily="18" charset="0"/>
+                                  <a:cs typeface="Times New Roman" panose="02020603050405020304" pitchFamily="18" charset="0"/>
+                                </a:rPr>
+                                <m:t>2</m:t>
+                              </m:r>
+                            </m:num>
+                            <m:den>
+                              <m:sSubSup>
+                                <m:sSubSupPr>
+                                  <m:ctrlPr>
+                                    <a:rPr lang="en-US" altLang="ja-JP" sz="2800" i="1" smtClean="0">
+                                      <a:latin typeface="Cambria Math" panose="02040503050406030204" pitchFamily="18" charset="0"/>
+                                      <a:ea typeface="Cambria Math" panose="02040503050406030204" pitchFamily="18" charset="0"/>
+                                      <a:cs typeface="Times New Roman" panose="02020603050405020304" pitchFamily="18" charset="0"/>
+                                    </a:rPr>
+                                  </m:ctrlPr>
+                                </m:sSubSupPr>
+                                <m:e>
+                                  <m:r>
+                                    <m:rPr>
+                                      <m:nor/>
+                                    </m:rPr>
+                                    <a:rPr lang="en-US" altLang="ja-JP" sz="2800" i="1">
+                                      <a:latin typeface="Times New Roman" panose="02020603050405020304" pitchFamily="18" charset="0"/>
+                                      <a:ea typeface="Cambria Math" panose="02040503050406030204" pitchFamily="18" charset="0"/>
+                                      <a:cs typeface="Times New Roman" panose="02020603050405020304" pitchFamily="18" charset="0"/>
+                                    </a:rPr>
+                                    <m:t>n</m:t>
+                                  </m:r>
+                                </m:e>
+                                <m:sub>
+                                  <m:r>
+                                    <m:rPr>
+                                      <m:nor/>
+                                    </m:rPr>
+                                    <a:rPr lang="en-US" altLang="ja-JP" sz="2800" b="0" i="1" smtClean="0">
+                                      <a:latin typeface="Times New Roman" panose="02020603050405020304" pitchFamily="18" charset="0"/>
+                                      <a:ea typeface="Cambria Math" panose="02040503050406030204" pitchFamily="18" charset="0"/>
+                                      <a:cs typeface="Times New Roman" panose="02020603050405020304" pitchFamily="18" charset="0"/>
+                                    </a:rPr>
+                                    <m:t>i</m:t>
+                                  </m:r>
+                                </m:sub>
+                                <m:sup>
+                                  <m:r>
+                                    <m:rPr>
+                                      <m:nor/>
+                                    </m:rPr>
+                                    <a:rPr lang="en-US" altLang="ja-JP" sz="2800" b="0" i="1" smtClean="0">
+                                      <a:latin typeface="Times New Roman" panose="02020603050405020304" pitchFamily="18" charset="0"/>
+                                      <a:ea typeface="Cambria Math" panose="02040503050406030204" pitchFamily="18" charset="0"/>
+                                      <a:cs typeface="Times New Roman" panose="02020603050405020304" pitchFamily="18" charset="0"/>
+                                    </a:rPr>
+                                    <m:t>j</m:t>
+                                  </m:r>
+                                </m:sup>
+                              </m:sSubSup>
+                              <m:r>
+                                <m:rPr>
+                                  <m:nor/>
+                                </m:rPr>
+                                <a:rPr lang="en-US" altLang="ja-JP" sz="2800" b="0" smtClean="0">
+                                  <a:latin typeface="Times New Roman" panose="02020603050405020304" pitchFamily="18" charset="0"/>
+                                  <a:ea typeface="Cambria Math" panose="02040503050406030204" pitchFamily="18" charset="0"/>
+                                  <a:cs typeface="Times New Roman" panose="02020603050405020304" pitchFamily="18" charset="0"/>
+                                </a:rPr>
+                                <m:t>(</m:t>
+                              </m:r>
+                              <m:r>
+                                <m:rPr>
+                                  <m:nor/>
+                                </m:rPr>
+                                <a:rPr lang="en-US" altLang="ja-JP" sz="2800" b="0" i="1" smtClean="0">
+                                  <a:latin typeface="Times New Roman" panose="02020603050405020304" pitchFamily="18" charset="0"/>
+                                  <a:ea typeface="Cambria Math" panose="02040503050406030204" pitchFamily="18" charset="0"/>
+                                  <a:cs typeface="Times New Roman" panose="02020603050405020304" pitchFamily="18" charset="0"/>
+                                </a:rPr>
+                                <m:t>d</m:t>
+                              </m:r>
+                              <m:r>
+                                <m:rPr>
+                                  <m:nor/>
+                                </m:rPr>
+                                <a:rPr lang="en-US" altLang="ja-JP" sz="2800" b="0" smtClean="0">
+                                  <a:latin typeface="Times New Roman" panose="02020603050405020304" pitchFamily="18" charset="0"/>
+                                  <a:ea typeface="Cambria Math" panose="02040503050406030204" pitchFamily="18" charset="0"/>
+                                  <a:cs typeface="Times New Roman" panose="02020603050405020304" pitchFamily="18" charset="0"/>
+                                </a:rPr>
+                                <m:t>)</m:t>
+                              </m:r>
+                            </m:den>
+                          </m:f>
+                        </m:e>
+                      </m:d>
+                    </m:oMath>
+                    <m:oMath xmlns:m="http://schemas.openxmlformats.org/officeDocument/2006/math">
+                      <m:r>
+                        <a:rPr lang="en-US" altLang="ja-JP" sz="2800" b="0" i="1" smtClean="0">
+                          <a:latin typeface="Cambria Math" panose="02040503050406030204" pitchFamily="18" charset="0"/>
+                          <a:ea typeface="Cambria Math" panose="02040503050406030204" pitchFamily="18" charset="0"/>
+                          <a:cs typeface="Times New Roman" panose="02020603050405020304" pitchFamily="18" charset="0"/>
+                        </a:rPr>
+                        <m:t>            </m:t>
+                      </m:r>
+                      <m:r>
+                        <m:rPr>
+                          <m:nor/>
+                        </m:rPr>
+                        <a:rPr lang="en-US" altLang="ja-JP" sz="2800" b="0" i="0" smtClean="0">
+                          <a:latin typeface="Times New Roman" panose="02020603050405020304" pitchFamily="18" charset="0"/>
+                          <a:ea typeface="Cambria Math" panose="02040503050406030204" pitchFamily="18" charset="0"/>
+                          <a:cs typeface="Times New Roman" panose="02020603050405020304" pitchFamily="18" charset="0"/>
+                        </a:rPr>
+                        <m:t>+</m:t>
+                      </m:r>
+                      <m:f>
+                        <m:fPr>
+                          <m:ctrlPr>
+                            <a:rPr lang="en-US" altLang="ja-JP" sz="2800" i="1" smtClean="0">
+                              <a:latin typeface="Cambria Math" panose="02040503050406030204" pitchFamily="18" charset="0"/>
+                            </a:rPr>
+                          </m:ctrlPr>
+                        </m:fPr>
+                        <m:num>
+                          <m:r>
+                            <m:rPr>
+                              <m:nor/>
+                            </m:rPr>
+                            <a:rPr lang="en-US" altLang="ja-JP" sz="2800">
+                              <a:latin typeface="Times New Roman" panose="02020603050405020304" pitchFamily="18" charset="0"/>
+                              <a:cs typeface="Times New Roman" panose="02020603050405020304" pitchFamily="18" charset="0"/>
+                            </a:rPr>
+                            <m:t>1</m:t>
+                          </m:r>
+                        </m:num>
+                        <m:den>
+                          <m:r>
+                            <m:rPr>
+                              <m:nor/>
+                            </m:rPr>
+                            <a:rPr lang="en-US" altLang="ja-JP" sz="2800" i="1">
+                              <a:latin typeface="Times New Roman" panose="02020603050405020304" pitchFamily="18" charset="0"/>
+                              <a:cs typeface="Times New Roman" panose="02020603050405020304" pitchFamily="18" charset="0"/>
+                            </a:rPr>
+                            <m:t>n</m:t>
+                          </m:r>
+                        </m:den>
+                      </m:f>
+                      <m:d>
+                        <m:dPr>
+                          <m:ctrlPr>
+                            <a:rPr lang="en-US" altLang="ja-JP" sz="2800" i="1">
+                              <a:latin typeface="Cambria Math" panose="02040503050406030204" pitchFamily="18" charset="0"/>
+                            </a:rPr>
+                          </m:ctrlPr>
+                        </m:dPr>
+                        <m:e>
+                          <m:f>
+                            <m:fPr>
+                              <m:ctrlPr>
+                                <a:rPr lang="en-US" altLang="ja-JP" sz="2800" i="1">
+                                  <a:latin typeface="Cambria Math" panose="02040503050406030204" pitchFamily="18" charset="0"/>
+                                </a:rPr>
+                              </m:ctrlPr>
+                            </m:fPr>
+                            <m:num>
+                              <m:d>
+                                <m:dPr>
+                                  <m:ctrlPr>
+                                    <a:rPr lang="en-US" altLang="ja-JP" sz="2800" i="1">
+                                      <a:latin typeface="Cambria Math" panose="02040503050406030204" pitchFamily="18" charset="0"/>
+                                    </a:rPr>
+                                  </m:ctrlPr>
+                                </m:dPr>
+                                <m:e>
+                                  <m:nary>
+                                    <m:naryPr>
+                                      <m:chr m:val="∑"/>
+                                      <m:supHide m:val="on"/>
+                                      <m:ctrlPr>
+                                        <a:rPr lang="en-US" altLang="ja-JP" sz="2800" i="1">
+                                          <a:latin typeface="Cambria Math" panose="02040503050406030204" pitchFamily="18" charset="0"/>
+                                        </a:rPr>
+                                      </m:ctrlPr>
+                                    </m:naryPr>
+                                    <m:sub>
+                                      <m:r>
+                                        <m:rPr>
+                                          <m:nor/>
+                                        </m:rPr>
+                                        <a:rPr lang="en-US" altLang="ja-JP" sz="2800" i="1">
+                                          <a:latin typeface="Times New Roman" panose="02020603050405020304" pitchFamily="18" charset="0"/>
+                                          <a:cs typeface="Times New Roman" panose="02020603050405020304" pitchFamily="18" charset="0"/>
+                                        </a:rPr>
+                                        <m:t>x</m:t>
+                                      </m:r>
+                                      <m:r>
+                                        <m:rPr>
+                                          <m:nor/>
+                                        </m:rPr>
+                                        <a:rPr lang="en-US" altLang="ja-JP" sz="2800" i="1" baseline="-25000">
+                                          <a:latin typeface="Times New Roman" panose="02020603050405020304" pitchFamily="18" charset="0"/>
+                                          <a:cs typeface="Times New Roman" panose="02020603050405020304" pitchFamily="18" charset="0"/>
+                                        </a:rPr>
+                                        <m:t>i</m:t>
+                                      </m:r>
+                                      <m:r>
+                                        <m:rPr>
+                                          <m:nor/>
+                                        </m:rPr>
+                                        <a:rPr lang="en-US" altLang="ja-JP" sz="2800">
+                                          <a:latin typeface="Times New Roman" panose="02020603050405020304" pitchFamily="18" charset="0"/>
+                                          <a:ea typeface="Cambria Math" panose="02040503050406030204" pitchFamily="18" charset="0"/>
+                                          <a:cs typeface="Times New Roman" panose="02020603050405020304" pitchFamily="18" charset="0"/>
+                                        </a:rPr>
+                                        <m:t>∈</m:t>
+                                      </m:r>
+                                      <m:r>
+                                        <m:rPr>
+                                          <m:nor/>
+                                        </m:rPr>
+                                        <a:rPr lang="en-US" altLang="ja-JP" sz="2800" i="1">
+                                          <a:latin typeface="Times New Roman" panose="02020603050405020304" pitchFamily="18" charset="0"/>
+                                          <a:ea typeface="Cambria Math" panose="02040503050406030204" pitchFamily="18" charset="0"/>
+                                          <a:cs typeface="Times New Roman" panose="02020603050405020304" pitchFamily="18" charset="0"/>
+                                        </a:rPr>
+                                        <m:t>A</m:t>
+                                      </m:r>
+                                      <m:r>
+                                        <m:rPr>
+                                          <m:nor/>
+                                        </m:rPr>
+                                        <a:rPr lang="en-US" altLang="ja-JP" sz="2800" i="1" baseline="-25000">
+                                          <a:latin typeface="Times New Roman" panose="02020603050405020304" pitchFamily="18" charset="0"/>
+                                          <a:ea typeface="Cambria Math" panose="02040503050406030204" pitchFamily="18" charset="0"/>
+                                          <a:cs typeface="Times New Roman" panose="02020603050405020304" pitchFamily="18" charset="0"/>
+                                        </a:rPr>
+                                        <m:t>r</m:t>
+                                      </m:r>
+                                    </m:sub>
+                                    <m:sup/>
+                                    <m:e>
+                                      <m:r>
+                                        <m:rPr>
+                                          <m:nor/>
+                                        </m:rPr>
+                                        <a:rPr lang="en-US" altLang="ja-JP" sz="2800" i="1">
+                                          <a:latin typeface="Times New Roman" panose="02020603050405020304" pitchFamily="18" charset="0"/>
+                                          <a:ea typeface="Cambria Math" panose="02040503050406030204" pitchFamily="18" charset="0"/>
+                                          <a:cs typeface="Times New Roman" panose="02020603050405020304" pitchFamily="18" charset="0"/>
+                                        </a:rPr>
+                                        <m:t>g</m:t>
+                                      </m:r>
+                                      <m:r>
+                                        <m:rPr>
+                                          <m:nor/>
+                                        </m:rPr>
+                                        <a:rPr lang="en-US" altLang="ja-JP" sz="2800" i="1" baseline="-25000">
+                                          <a:latin typeface="Times New Roman" panose="02020603050405020304" pitchFamily="18" charset="0"/>
+                                          <a:ea typeface="Cambria Math" panose="02040503050406030204" pitchFamily="18" charset="0"/>
+                                          <a:cs typeface="Times New Roman" panose="02020603050405020304" pitchFamily="18" charset="0"/>
+                                        </a:rPr>
+                                        <m:t>i</m:t>
+                                      </m:r>
+                                      <m:r>
+                                        <m:rPr>
+                                          <m:nor/>
+                                        </m:rPr>
+                                        <a:rPr lang="en-US" altLang="ja-JP" sz="2800" b="0" i="1" smtClean="0">
+                                          <a:latin typeface="Times New Roman" panose="02020603050405020304" pitchFamily="18" charset="0"/>
+                                          <a:ea typeface="Cambria Math" panose="02040503050406030204" pitchFamily="18" charset="0"/>
+                                          <a:cs typeface="Times New Roman" panose="02020603050405020304" pitchFamily="18" charset="0"/>
+                                        </a:rPr>
+                                        <m:t> +</m:t>
+                                      </m:r>
+                                      <m:f>
+                                        <m:fPr>
+                                          <m:ctrlPr>
+                                            <a:rPr lang="en-US" altLang="ja-JP" sz="2800" i="1">
+                                              <a:latin typeface="Cambria Math" panose="02040503050406030204" pitchFamily="18" charset="0"/>
+                                              <a:ea typeface="Cambria Math" panose="02040503050406030204" pitchFamily="18" charset="0"/>
+                                            </a:rPr>
+                                          </m:ctrlPr>
+                                        </m:fPr>
+                                        <m:num>
+                                          <m:r>
+                                            <m:rPr>
+                                              <m:nor/>
+                                            </m:rPr>
+                                            <a:rPr lang="en-US" altLang="ja-JP" sz="2800">
+                                              <a:latin typeface="Times New Roman" panose="02020603050405020304" pitchFamily="18" charset="0"/>
+                                              <a:ea typeface="Cambria Math" panose="02040503050406030204" pitchFamily="18" charset="0"/>
+                                              <a:cs typeface="Times New Roman" panose="02020603050405020304" pitchFamily="18" charset="0"/>
+                                            </a:rPr>
+                                            <m:t>1</m:t>
+                                          </m:r>
+                                          <m:r>
+                                            <m:rPr>
+                                              <m:nor/>
+                                            </m:rPr>
+                                            <a:rPr lang="en-US" altLang="ja-JP" sz="2800" i="1">
+                                              <a:latin typeface="Times New Roman" panose="02020603050405020304" pitchFamily="18" charset="0"/>
+                                              <a:ea typeface="Cambria Math" panose="02040503050406030204" pitchFamily="18" charset="0"/>
+                                              <a:cs typeface="Times New Roman" panose="02020603050405020304" pitchFamily="18" charset="0"/>
+                                            </a:rPr>
+                                            <m:t>−</m:t>
+                                          </m:r>
+                                          <m:r>
+                                            <m:rPr>
+                                              <m:nor/>
+                                            </m:rPr>
+                                            <a:rPr lang="en-US" altLang="ja-JP" sz="2800" i="1">
+                                              <a:latin typeface="Times New Roman" panose="02020603050405020304" pitchFamily="18" charset="0"/>
+                                              <a:ea typeface="Cambria Math" panose="02040503050406030204" pitchFamily="18" charset="0"/>
+                                              <a:cs typeface="Times New Roman" panose="02020603050405020304" pitchFamily="18" charset="0"/>
+                                            </a:rPr>
+                                            <m:t>a</m:t>
+                                          </m:r>
+                                        </m:num>
+                                        <m:den>
+                                          <m:r>
+                                            <m:rPr>
+                                              <m:nor/>
+                                            </m:rPr>
+                                            <a:rPr lang="en-US" altLang="ja-JP" sz="2800" i="1">
+                                              <a:latin typeface="Times New Roman" panose="02020603050405020304" pitchFamily="18" charset="0"/>
+                                              <a:ea typeface="Cambria Math" panose="02040503050406030204" pitchFamily="18" charset="0"/>
+                                              <a:cs typeface="Times New Roman" panose="02020603050405020304" pitchFamily="18" charset="0"/>
+                                            </a:rPr>
+                                            <m:t>b</m:t>
+                                          </m:r>
+                                        </m:den>
+                                      </m:f>
+                                      <m:nary>
+                                        <m:naryPr>
+                                          <m:chr m:val="∑"/>
+                                          <m:supHide m:val="on"/>
+                                          <m:ctrlPr>
+                                            <a:rPr lang="en-US" altLang="ja-JP" sz="2800" i="1">
+                                              <a:latin typeface="Cambria Math" panose="02040503050406030204" pitchFamily="18" charset="0"/>
+                                              <a:ea typeface="Cambria Math" panose="02040503050406030204" pitchFamily="18" charset="0"/>
+                                            </a:rPr>
+                                          </m:ctrlPr>
+                                        </m:naryPr>
+                                        <m:sub>
+                                          <m:r>
+                                            <m:rPr>
+                                              <m:nor/>
+                                            </m:rPr>
+                                            <a:rPr lang="en-US" altLang="ja-JP" sz="2800" i="1">
+                                              <a:latin typeface="Times New Roman" panose="02020603050405020304" pitchFamily="18" charset="0"/>
+                                              <a:ea typeface="Cambria Math" panose="02040503050406030204" pitchFamily="18" charset="0"/>
+                                              <a:cs typeface="Times New Roman" panose="02020603050405020304" pitchFamily="18" charset="0"/>
+                                            </a:rPr>
+                                            <m:t>x</m:t>
+                                          </m:r>
+                                          <m:r>
+                                            <m:rPr>
+                                              <m:nor/>
+                                            </m:rPr>
+                                            <a:rPr lang="en-US" altLang="ja-JP" sz="2800" i="1" baseline="-25000">
+                                              <a:latin typeface="Times New Roman" panose="02020603050405020304" pitchFamily="18" charset="0"/>
+                                              <a:ea typeface="Cambria Math" panose="02040503050406030204" pitchFamily="18" charset="0"/>
+                                              <a:cs typeface="Times New Roman" panose="02020603050405020304" pitchFamily="18" charset="0"/>
+                                            </a:rPr>
+                                            <m:t>i</m:t>
+                                          </m:r>
+                                          <m:r>
+                                            <m:rPr>
+                                              <m:nor/>
+                                            </m:rPr>
+                                            <a:rPr lang="en-US" altLang="ja-JP" sz="2800">
+                                              <a:latin typeface="Times New Roman" panose="02020603050405020304" pitchFamily="18" charset="0"/>
+                                              <a:ea typeface="Cambria Math" panose="02040503050406030204" pitchFamily="18" charset="0"/>
+                                              <a:cs typeface="Times New Roman" panose="02020603050405020304" pitchFamily="18" charset="0"/>
+                                            </a:rPr>
+                                            <m:t>∈</m:t>
+                                          </m:r>
+                                          <m:r>
+                                            <m:rPr>
+                                              <m:nor/>
+                                            </m:rPr>
+                                            <a:rPr lang="en-US" altLang="ja-JP" sz="2800" i="1">
+                                              <a:latin typeface="Times New Roman" panose="02020603050405020304" pitchFamily="18" charset="0"/>
+                                              <a:ea typeface="Cambria Math" panose="02040503050406030204" pitchFamily="18" charset="0"/>
+                                              <a:cs typeface="Times New Roman" panose="02020603050405020304" pitchFamily="18" charset="0"/>
+                                            </a:rPr>
+                                            <m:t>B</m:t>
+                                          </m:r>
+                                          <m:r>
+                                            <m:rPr>
+                                              <m:nor/>
+                                            </m:rPr>
+                                            <a:rPr lang="en-US" altLang="ja-JP" sz="2800" i="1" baseline="-25000">
+                                              <a:latin typeface="Times New Roman" panose="02020603050405020304" pitchFamily="18" charset="0"/>
+                                              <a:ea typeface="Cambria Math" panose="02040503050406030204" pitchFamily="18" charset="0"/>
+                                              <a:cs typeface="Times New Roman" panose="02020603050405020304" pitchFamily="18" charset="0"/>
+                                            </a:rPr>
+                                            <m:t>r</m:t>
+                                          </m:r>
+                                        </m:sub>
+                                        <m:sup/>
+                                        <m:e>
+                                          <m:r>
+                                            <m:rPr>
+                                              <m:nor/>
+                                            </m:rPr>
+                                            <a:rPr lang="en-US" altLang="ja-JP" sz="2800" i="1">
+                                              <a:latin typeface="Times New Roman" panose="02020603050405020304" pitchFamily="18" charset="0"/>
+                                              <a:ea typeface="Cambria Math" panose="02040503050406030204" pitchFamily="18" charset="0"/>
+                                              <a:cs typeface="Times New Roman" panose="02020603050405020304" pitchFamily="18" charset="0"/>
+                                            </a:rPr>
+                                            <m:t>g</m:t>
+                                          </m:r>
+                                          <m:r>
+                                            <m:rPr>
+                                              <m:nor/>
+                                            </m:rPr>
+                                            <a:rPr lang="en-US" altLang="ja-JP" sz="2800" i="1" baseline="-25000">
+                                              <a:latin typeface="Times New Roman" panose="02020603050405020304" pitchFamily="18" charset="0"/>
+                                              <a:ea typeface="Cambria Math" panose="02040503050406030204" pitchFamily="18" charset="0"/>
+                                              <a:cs typeface="Times New Roman" panose="02020603050405020304" pitchFamily="18" charset="0"/>
+                                            </a:rPr>
+                                            <m:t>i</m:t>
+                                          </m:r>
+                                        </m:e>
+                                      </m:nary>
+                                    </m:e>
+                                  </m:nary>
+                                  <m:r>
+                                    <m:rPr>
+                                      <m:nor/>
+                                    </m:rPr>
+                                    <a:rPr lang="en-US" altLang="ja-JP" sz="2800" i="1">
+                                      <a:latin typeface="Times New Roman" panose="02020603050405020304" pitchFamily="18" charset="0"/>
+                                      <a:ea typeface="Cambria Math" panose="02040503050406030204" pitchFamily="18" charset="0"/>
+                                      <a:cs typeface="Times New Roman" panose="02020603050405020304" pitchFamily="18" charset="0"/>
+                                    </a:rPr>
+                                    <m:t> </m:t>
+                                  </m:r>
+                                </m:e>
+                              </m:d>
+                              <m:r>
+                                <m:rPr>
+                                  <m:nor/>
+                                </m:rPr>
+                                <a:rPr lang="en-US" altLang="ja-JP" sz="2800" baseline="30000">
+                                  <a:latin typeface="Times New Roman" panose="02020603050405020304" pitchFamily="18" charset="0"/>
+                                  <a:ea typeface="Cambria Math" panose="02040503050406030204" pitchFamily="18" charset="0"/>
+                                  <a:cs typeface="Times New Roman" panose="02020603050405020304" pitchFamily="18" charset="0"/>
+                                </a:rPr>
+                                <m:t>2</m:t>
+                              </m:r>
+                            </m:num>
+                            <m:den>
+                              <m:sSubSup>
+                                <m:sSubSupPr>
+                                  <m:ctrlPr>
+                                    <a:rPr lang="en-US" altLang="ja-JP" sz="2800" i="1">
+                                      <a:latin typeface="Cambria Math" panose="02040503050406030204" pitchFamily="18" charset="0"/>
+                                      <a:ea typeface="Cambria Math" panose="02040503050406030204" pitchFamily="18" charset="0"/>
+                                      <a:cs typeface="Times New Roman" panose="02020603050405020304" pitchFamily="18" charset="0"/>
+                                    </a:rPr>
+                                  </m:ctrlPr>
+                                </m:sSubSupPr>
+                                <m:e>
+                                  <m:r>
+                                    <m:rPr>
+                                      <m:nor/>
+                                    </m:rPr>
+                                    <a:rPr lang="en-US" altLang="ja-JP" sz="2800" i="1">
+                                      <a:latin typeface="Times New Roman" panose="02020603050405020304" pitchFamily="18" charset="0"/>
+                                      <a:ea typeface="Cambria Math" panose="02040503050406030204" pitchFamily="18" charset="0"/>
+                                      <a:cs typeface="Times New Roman" panose="02020603050405020304" pitchFamily="18" charset="0"/>
+                                    </a:rPr>
+                                    <m:t>n</m:t>
+                                  </m:r>
+                                </m:e>
+                                <m:sub>
+                                  <m:r>
+                                    <m:rPr>
+                                      <m:nor/>
+                                    </m:rPr>
+                                    <a:rPr lang="en-US" altLang="ja-JP" sz="2800" i="1">
+                                      <a:latin typeface="Times New Roman" panose="02020603050405020304" pitchFamily="18" charset="0"/>
+                                      <a:ea typeface="Cambria Math" panose="02040503050406030204" pitchFamily="18" charset="0"/>
+                                      <a:cs typeface="Times New Roman" panose="02020603050405020304" pitchFamily="18" charset="0"/>
+                                    </a:rPr>
+                                    <m:t>i</m:t>
+                                  </m:r>
+                                </m:sub>
+                                <m:sup>
+                                  <m:r>
+                                    <m:rPr>
+                                      <m:nor/>
+                                    </m:rPr>
+                                    <a:rPr lang="en-US" altLang="ja-JP" sz="2800" i="1">
+                                      <a:latin typeface="Times New Roman" panose="02020603050405020304" pitchFamily="18" charset="0"/>
+                                      <a:ea typeface="Cambria Math" panose="02040503050406030204" pitchFamily="18" charset="0"/>
+                                      <a:cs typeface="Times New Roman" panose="02020603050405020304" pitchFamily="18" charset="0"/>
+                                    </a:rPr>
+                                    <m:t>j</m:t>
+                                  </m:r>
+                                </m:sup>
+                              </m:sSubSup>
+                              <m:r>
+                                <m:rPr>
+                                  <m:nor/>
+                                </m:rPr>
+                                <a:rPr lang="en-US" altLang="ja-JP" sz="2800">
+                                  <a:latin typeface="Times New Roman" panose="02020603050405020304" pitchFamily="18" charset="0"/>
+                                  <a:ea typeface="Cambria Math" panose="02040503050406030204" pitchFamily="18" charset="0"/>
+                                  <a:cs typeface="Times New Roman" panose="02020603050405020304" pitchFamily="18" charset="0"/>
+                                </a:rPr>
+                                <m:t>(</m:t>
+                              </m:r>
+                              <m:r>
+                                <m:rPr>
+                                  <m:nor/>
+                                </m:rPr>
+                                <a:rPr lang="en-US" altLang="ja-JP" sz="2800" i="1">
+                                  <a:latin typeface="Times New Roman" panose="02020603050405020304" pitchFamily="18" charset="0"/>
+                                  <a:ea typeface="Cambria Math" panose="02040503050406030204" pitchFamily="18" charset="0"/>
+                                  <a:cs typeface="Times New Roman" panose="02020603050405020304" pitchFamily="18" charset="0"/>
+                                </a:rPr>
+                                <m:t>d</m:t>
+                              </m:r>
+                              <m:r>
+                                <m:rPr>
+                                  <m:nor/>
+                                </m:rPr>
+                                <a:rPr lang="en-US" altLang="ja-JP" sz="2800">
+                                  <a:latin typeface="Times New Roman" panose="02020603050405020304" pitchFamily="18" charset="0"/>
+                                  <a:ea typeface="Cambria Math" panose="02040503050406030204" pitchFamily="18" charset="0"/>
+                                  <a:cs typeface="Times New Roman" panose="02020603050405020304" pitchFamily="18" charset="0"/>
+                                </a:rPr>
+                                <m:t>)</m:t>
+                              </m:r>
+                            </m:den>
+                          </m:f>
+                        </m:e>
+                      </m:d>
+                    </m:oMath>
+                  </m:oMathPara>
+                </a14:m>
+                <a:endParaRPr kumimoji="1" lang="en-US" altLang="ja-JP" sz="2800" i="1" dirty="0" smtClean="0">
+                  <a:latin typeface="Times New Roman" panose="02020603050405020304" pitchFamily="18" charset="0"/>
+                  <a:cs typeface="Times New Roman" panose="02020603050405020304" pitchFamily="18" charset="0"/>
+                </a:endParaRPr>
+              </a:p>
+              <a:p>
+                <a:endParaRPr kumimoji="1" lang="ja-JP" altLang="en-US" dirty="0">
+                  <a:latin typeface="Times New Roman" panose="02020603050405020304" pitchFamily="18" charset="0"/>
+                  <a:cs typeface="Times New Roman" panose="02020603050405020304" pitchFamily="18" charset="0"/>
+                </a:endParaRPr>
+              </a:p>
+            </p:txBody>
+          </p:sp>
+        </mc:Choice>
+        <mc:Fallback>
+          <p:sp>
+            <p:nvSpPr>
+              <p:cNvPr id="3" name="コンテンツ プレースホルダー 2"/>
+              <p:cNvSpPr>
+                <a:spLocks noGrp="1" noRot="1" noChangeAspect="1" noMove="1" noResize="1" noEditPoints="1" noAdjustHandles="1" noChangeArrowheads="1" noChangeShapeType="1" noTextEdit="1"/>
+              </p:cNvSpPr>
+              <p:nvPr>
+                <p:ph idx="1"/>
+              </p:nvPr>
+            </p:nvSpPr>
+            <p:spPr>
+              <a:blipFill rotWithShape="0">
+                <a:blip r:embed="rId2"/>
+                <a:stretch>
+                  <a:fillRect l="-1825" t="-1882"/>
+                </a:stretch>
+              </a:blipFill>
+            </p:spPr>
+            <p:txBody>
+              <a:bodyPr/>
+              <a:lstStyle/>
+              <a:p>
+                <a:r>
+                  <a:rPr lang="ja-JP" altLang="en-US">
+                    <a:noFill/>
+                  </a:rPr>
+                  <a:t> </a:t>
+                </a:r>
+              </a:p>
+            </p:txBody>
+          </p:sp>
+        </mc:Fallback>
+      </mc:AlternateContent>
+      <p:sp>
+        <p:nvSpPr>
+          <p:cNvPr id="4" name="スライド番号プレースホルダー 3"/>
+          <p:cNvSpPr>
+            <a:spLocks noGrp="1"/>
+          </p:cNvSpPr>
+          <p:nvPr>
+            <p:ph type="sldNum" sz="quarter" idx="12"/>
+          </p:nvPr>
+        </p:nvSpPr>
+        <p:spPr/>
+        <p:txBody>
+          <a:bodyPr/>
+          <a:lstStyle/>
+          <a:p>
+            <a:fld id="{B5C67937-D10B-4F1B-BCB2-26B69D4AE1E2}" type="slidenum">
+              <a:rPr kumimoji="1" lang="ja-JP" altLang="en-US" smtClean="0"/>
+              <a:pPr/>
+              <a:t>2</a:t>
+            </a:fld>
+            <a:endParaRPr kumimoji="1" lang="ja-JP" altLang="en-US" dirty="0"/>
+          </a:p>
+        </p:txBody>
+      </p:sp>
+      <p:grpSp>
+        <p:nvGrpSpPr>
+          <p:cNvPr id="14" name="グループ化 13"/>
+          <p:cNvGrpSpPr/>
+          <p:nvPr/>
+        </p:nvGrpSpPr>
+        <p:grpSpPr>
+          <a:xfrm>
+            <a:off x="7006885" y="3020851"/>
+            <a:ext cx="1743808" cy="523220"/>
+            <a:chOff x="6781800" y="3020851"/>
+            <a:chExt cx="1743808" cy="523220"/>
+          </a:xfrm>
+        </p:grpSpPr>
+        <p:sp>
+          <p:nvSpPr>
+            <p:cNvPr id="10" name="右矢印 9"/>
+            <p:cNvSpPr/>
+            <p:nvPr/>
+          </p:nvSpPr>
+          <p:spPr>
+            <a:xfrm rot="10800000">
+              <a:off x="6781800" y="3094892"/>
+              <a:ext cx="590843" cy="375138"/>
+            </a:xfrm>
+            <a:prstGeom prst="rightArrow">
+              <a:avLst/>
+            </a:prstGeom>
+            <a:solidFill>
+              <a:schemeClr val="accent2"/>
+            </a:solidFill>
+            <a:ln>
+              <a:solidFill>
+                <a:schemeClr val="accent2"/>
+              </a:solidFill>
+            </a:ln>
+          </p:spPr>
+          <p:style>
+            <a:lnRef idx="2">
+              <a:schemeClr val="accent1">
+                <a:shade val="50000"/>
+              </a:schemeClr>
+            </a:lnRef>
+            <a:fillRef idx="1">
+              <a:schemeClr val="accent1"/>
+            </a:fillRef>
+            <a:effectRef idx="0">
+              <a:schemeClr val="accent1"/>
+            </a:effectRef>
+            <a:fontRef idx="minor">
+              <a:schemeClr val="lt1"/>
+            </a:fontRef>
+          </p:style>
+          <p:txBody>
+            <a:bodyPr rtlCol="0" anchor="ctr"/>
+            <a:lstStyle/>
+            <a:p>
+              <a:pPr algn="ctr"/>
+              <a:endParaRPr kumimoji="1" lang="ja-JP" altLang="en-US"/>
+            </a:p>
+          </p:txBody>
+        </p:sp>
+        <p:sp>
+          <p:nvSpPr>
+            <p:cNvPr id="12" name="テキスト ボックス 11"/>
+            <p:cNvSpPr txBox="1"/>
+            <p:nvPr/>
+          </p:nvSpPr>
+          <p:spPr>
+            <a:xfrm>
+              <a:off x="7171592" y="3020851"/>
+              <a:ext cx="1354016" cy="523220"/>
+            </a:xfrm>
+            <a:prstGeom prst="rect">
+              <a:avLst/>
+            </a:prstGeom>
+            <a:noFill/>
+          </p:spPr>
+          <p:txBody>
+            <a:bodyPr wrap="square" rtlCol="0">
+              <a:spAutoFit/>
+            </a:bodyPr>
+            <a:lstStyle/>
+            <a:p>
+              <a:pPr algn="ctr"/>
+              <a:r>
+                <a:rPr lang="ja-JP" altLang="en-US" sz="2800" dirty="0" smtClean="0"/>
+                <a:t>左側</a:t>
+              </a:r>
+              <a:endParaRPr kumimoji="1" lang="ja-JP" altLang="en-US" sz="2800" dirty="0" smtClean="0"/>
+            </a:p>
+          </p:txBody>
+        </p:sp>
+      </p:grpSp>
+      <p:grpSp>
+        <p:nvGrpSpPr>
+          <p:cNvPr id="15" name="グループ化 14"/>
+          <p:cNvGrpSpPr/>
+          <p:nvPr/>
+        </p:nvGrpSpPr>
+        <p:grpSpPr>
+          <a:xfrm>
+            <a:off x="7006885" y="4374867"/>
+            <a:ext cx="1743808" cy="523220"/>
+            <a:chOff x="6781800" y="4374867"/>
+            <a:chExt cx="1743808" cy="523220"/>
+          </a:xfrm>
+        </p:grpSpPr>
+        <p:sp>
+          <p:nvSpPr>
+            <p:cNvPr id="11" name="右矢印 10"/>
+            <p:cNvSpPr/>
+            <p:nvPr/>
+          </p:nvSpPr>
+          <p:spPr>
+            <a:xfrm rot="10800000">
+              <a:off x="6781800" y="4448908"/>
+              <a:ext cx="590843" cy="375138"/>
+            </a:xfrm>
+            <a:prstGeom prst="rightArrow">
+              <a:avLst/>
+            </a:prstGeom>
+            <a:solidFill>
+              <a:schemeClr val="accent2"/>
+            </a:solidFill>
+            <a:ln>
+              <a:solidFill>
+                <a:schemeClr val="accent2"/>
+              </a:solidFill>
+            </a:ln>
+          </p:spPr>
+          <p:style>
+            <a:lnRef idx="2">
+              <a:schemeClr val="accent1">
+                <a:shade val="50000"/>
+              </a:schemeClr>
+            </a:lnRef>
+            <a:fillRef idx="1">
+              <a:schemeClr val="accent1"/>
+            </a:fillRef>
+            <a:effectRef idx="0">
+              <a:schemeClr val="accent1"/>
+            </a:effectRef>
+            <a:fontRef idx="minor">
+              <a:schemeClr val="lt1"/>
+            </a:fontRef>
+          </p:style>
+          <p:txBody>
+            <a:bodyPr rtlCol="0" anchor="ctr"/>
+            <a:lstStyle/>
+            <a:p>
+              <a:pPr algn="ctr"/>
+              <a:endParaRPr kumimoji="1" lang="ja-JP" altLang="en-US"/>
+            </a:p>
+          </p:txBody>
+        </p:sp>
+        <p:sp>
+          <p:nvSpPr>
+            <p:cNvPr id="13" name="テキスト ボックス 12"/>
+            <p:cNvSpPr txBox="1"/>
+            <p:nvPr/>
+          </p:nvSpPr>
+          <p:spPr>
+            <a:xfrm>
+              <a:off x="7171592" y="4374867"/>
+              <a:ext cx="1354016" cy="523220"/>
+            </a:xfrm>
+            <a:prstGeom prst="rect">
+              <a:avLst/>
+            </a:prstGeom>
+            <a:noFill/>
+          </p:spPr>
+          <p:txBody>
+            <a:bodyPr wrap="square" rtlCol="0">
+              <a:spAutoFit/>
+            </a:bodyPr>
+            <a:lstStyle/>
+            <a:p>
+              <a:pPr algn="ctr"/>
+              <a:r>
+                <a:rPr lang="ja-JP" altLang="en-US" sz="2800" dirty="0"/>
+                <a:t>右</a:t>
+              </a:r>
+              <a:r>
+                <a:rPr lang="ja-JP" altLang="en-US" sz="2800" dirty="0" smtClean="0"/>
+                <a:t>側</a:t>
+              </a:r>
+              <a:endParaRPr kumimoji="1" lang="ja-JP" altLang="en-US" sz="2800" dirty="0" smtClean="0"/>
+            </a:p>
+          </p:txBody>
+        </p:sp>
+      </p:grpSp>
+      <p:sp>
+        <p:nvSpPr>
+          <p:cNvPr id="16" name="正方形/長方形 15"/>
+          <p:cNvSpPr/>
+          <p:nvPr/>
+        </p:nvSpPr>
+        <p:spPr>
+          <a:xfrm>
+            <a:off x="2166718" y="2504050"/>
+            <a:ext cx="1462747" cy="722140"/>
+          </a:xfrm>
+          <a:prstGeom prst="rect">
+            <a:avLst/>
+          </a:prstGeom>
+          <a:noFill/>
+          <a:ln w="38100"/>
+        </p:spPr>
+        <p:style>
+          <a:lnRef idx="2">
+            <a:schemeClr val="accent1">
+              <a:shade val="50000"/>
+            </a:schemeClr>
+          </a:lnRef>
+          <a:fillRef idx="1">
+            <a:schemeClr val="accent1"/>
+          </a:fillRef>
+          <a:effectRef idx="0">
+            <a:schemeClr val="accent1"/>
+          </a:effectRef>
+          <a:fontRef idx="minor">
+            <a:schemeClr val="lt1"/>
+          </a:fontRef>
+        </p:style>
+        <p:txBody>
+          <a:bodyPr rtlCol="0" anchor="ctr"/>
+          <a:lstStyle/>
+          <a:p>
+            <a:pPr algn="ctr"/>
+            <a:endParaRPr kumimoji="1" lang="ja-JP" altLang="en-US"/>
+          </a:p>
+        </p:txBody>
+      </p:sp>
+      <p:sp>
+        <p:nvSpPr>
+          <p:cNvPr id="21" name="正方形/長方形 20"/>
+          <p:cNvSpPr/>
+          <p:nvPr/>
+        </p:nvSpPr>
+        <p:spPr>
+          <a:xfrm>
+            <a:off x="4646003" y="2504050"/>
+            <a:ext cx="1462747" cy="722140"/>
+          </a:xfrm>
+          <a:prstGeom prst="rect">
+            <a:avLst/>
+          </a:prstGeom>
+          <a:noFill/>
+          <a:ln w="38100"/>
+        </p:spPr>
+        <p:style>
+          <a:lnRef idx="2">
+            <a:schemeClr val="accent1">
+              <a:shade val="50000"/>
+            </a:schemeClr>
+          </a:lnRef>
+          <a:fillRef idx="1">
+            <a:schemeClr val="accent1"/>
+          </a:fillRef>
+          <a:effectRef idx="0">
+            <a:schemeClr val="accent1"/>
+          </a:effectRef>
+          <a:fontRef idx="minor">
+            <a:schemeClr val="lt1"/>
+          </a:fontRef>
+        </p:style>
+        <p:txBody>
+          <a:bodyPr rtlCol="0" anchor="ctr"/>
+          <a:lstStyle/>
+          <a:p>
+            <a:pPr algn="ctr"/>
+            <a:endParaRPr kumimoji="1" lang="ja-JP" altLang="en-US"/>
+          </a:p>
+        </p:txBody>
+      </p:sp>
+      <p:sp>
+        <p:nvSpPr>
+          <p:cNvPr id="22" name="正方形/長方形 21"/>
+          <p:cNvSpPr/>
+          <p:nvPr/>
+        </p:nvSpPr>
+        <p:spPr>
+          <a:xfrm>
+            <a:off x="4646002" y="3912482"/>
+            <a:ext cx="1483336" cy="722140"/>
+          </a:xfrm>
+          <a:prstGeom prst="rect">
+            <a:avLst/>
+          </a:prstGeom>
+          <a:noFill/>
+          <a:ln w="38100"/>
+        </p:spPr>
+        <p:style>
+          <a:lnRef idx="2">
+            <a:schemeClr val="accent1">
+              <a:shade val="50000"/>
+            </a:schemeClr>
+          </a:lnRef>
+          <a:fillRef idx="1">
+            <a:schemeClr val="accent1"/>
+          </a:fillRef>
+          <a:effectRef idx="0">
+            <a:schemeClr val="accent1"/>
+          </a:effectRef>
+          <a:fontRef idx="minor">
+            <a:schemeClr val="lt1"/>
+          </a:fontRef>
+        </p:style>
+        <p:txBody>
+          <a:bodyPr rtlCol="0" anchor="ctr"/>
+          <a:lstStyle/>
+          <a:p>
+            <a:pPr algn="ctr"/>
+            <a:endParaRPr kumimoji="1" lang="ja-JP" altLang="en-US"/>
+          </a:p>
+        </p:txBody>
+      </p:sp>
+      <p:sp>
+        <p:nvSpPr>
+          <p:cNvPr id="23" name="正方形/長方形 22"/>
+          <p:cNvSpPr/>
+          <p:nvPr/>
+        </p:nvSpPr>
+        <p:spPr>
+          <a:xfrm>
+            <a:off x="3968847" y="2504050"/>
+            <a:ext cx="649020" cy="722140"/>
+          </a:xfrm>
+          <a:prstGeom prst="rect">
+            <a:avLst/>
+          </a:prstGeom>
+          <a:noFill/>
+          <a:ln w="38100"/>
+        </p:spPr>
+        <p:style>
+          <a:lnRef idx="2">
+            <a:schemeClr val="accent1">
+              <a:shade val="50000"/>
+            </a:schemeClr>
+          </a:lnRef>
+          <a:fillRef idx="1">
+            <a:schemeClr val="accent1"/>
+          </a:fillRef>
+          <a:effectRef idx="0">
+            <a:schemeClr val="accent1"/>
+          </a:effectRef>
+          <a:fontRef idx="minor">
+            <a:schemeClr val="lt1"/>
+          </a:fontRef>
+        </p:style>
+        <p:txBody>
+          <a:bodyPr rtlCol="0" anchor="ctr"/>
+          <a:lstStyle/>
+          <a:p>
+            <a:pPr algn="ctr"/>
+            <a:endParaRPr kumimoji="1" lang="ja-JP" altLang="en-US"/>
+          </a:p>
+        </p:txBody>
+      </p:sp>
+      <p:sp>
+        <p:nvSpPr>
+          <p:cNvPr id="24" name="正方形/長方形 23"/>
+          <p:cNvSpPr/>
+          <p:nvPr/>
+        </p:nvSpPr>
+        <p:spPr>
+          <a:xfrm>
+            <a:off x="3968846" y="3912482"/>
+            <a:ext cx="649020" cy="722140"/>
+          </a:xfrm>
+          <a:prstGeom prst="rect">
+            <a:avLst/>
+          </a:prstGeom>
+          <a:noFill/>
+          <a:ln w="38100"/>
+        </p:spPr>
+        <p:style>
+          <a:lnRef idx="2">
+            <a:schemeClr val="accent1">
+              <a:shade val="50000"/>
+            </a:schemeClr>
+          </a:lnRef>
+          <a:fillRef idx="1">
+            <a:schemeClr val="accent1"/>
+          </a:fillRef>
+          <a:effectRef idx="0">
+            <a:schemeClr val="accent1"/>
+          </a:effectRef>
+          <a:fontRef idx="minor">
+            <a:schemeClr val="lt1"/>
+          </a:fontRef>
+        </p:style>
+        <p:txBody>
+          <a:bodyPr rtlCol="0" anchor="ctr"/>
+          <a:lstStyle/>
+          <a:p>
+            <a:pPr algn="ctr"/>
+            <a:endParaRPr kumimoji="1" lang="ja-JP" altLang="en-US"/>
+          </a:p>
+        </p:txBody>
+      </p:sp>
+      <p:sp>
+        <p:nvSpPr>
+          <p:cNvPr id="25" name="正方形/長方形 24"/>
+          <p:cNvSpPr/>
+          <p:nvPr/>
+        </p:nvSpPr>
+        <p:spPr>
+          <a:xfrm>
+            <a:off x="2145506" y="3912482"/>
+            <a:ext cx="1483959" cy="722140"/>
+          </a:xfrm>
+          <a:prstGeom prst="rect">
+            <a:avLst/>
+          </a:prstGeom>
+          <a:noFill/>
+          <a:ln w="38100"/>
+        </p:spPr>
+        <p:style>
+          <a:lnRef idx="2">
+            <a:schemeClr val="accent1">
+              <a:shade val="50000"/>
+            </a:schemeClr>
+          </a:lnRef>
+          <a:fillRef idx="1">
+            <a:schemeClr val="accent1"/>
+          </a:fillRef>
+          <a:effectRef idx="0">
+            <a:schemeClr val="accent1"/>
+          </a:effectRef>
+          <a:fontRef idx="minor">
+            <a:schemeClr val="lt1"/>
+          </a:fontRef>
+        </p:style>
+        <p:txBody>
+          <a:bodyPr rtlCol="0" anchor="ctr"/>
+          <a:lstStyle/>
+          <a:p>
+            <a:pPr algn="ctr"/>
+            <a:endParaRPr kumimoji="1" lang="ja-JP" altLang="en-US"/>
+          </a:p>
+        </p:txBody>
+      </p:sp>
+    </p:spTree>
+    <p:extLst>
+      <p:ext uri="{BB962C8B-B14F-4D97-AF65-F5344CB8AC3E}">
+        <p14:creationId xmlns:p14="http://schemas.microsoft.com/office/powerpoint/2010/main" val="46215987"/>
+      </p:ext>
+    </p:extLst>
+  </p:cSld>
+  <p:clrMapOvr>
+    <a:masterClrMapping/>
+  </p:clrMapOvr>
+  <p:timing>
+    <p:tnLst>
+      <p:par>
+        <p:cTn id="1" dur="indefinite" restart="never" nodeType="tmRoot">
+          <p:childTnLst>
+            <p:seq concurrent="1" nextAc="seek">
+              <p:cTn id="2" dur="indefinite" nodeType="mainSeq">
+                <p:childTnLst>
+                  <p:par>
+                    <p:cTn id="3" fill="hold">
+                      <p:stCondLst>
+                        <p:cond delay="indefinite"/>
+                      </p:stCondLst>
+                      <p:childTnLst>
+                        <p:par>
+                          <p:cTn id="4" fill="hold">
+                            <p:stCondLst>
+                              <p:cond delay="0"/>
+                            </p:stCondLst>
+                            <p:childTnLst>
+                              <p:par>
+                                <p:cTn id="5" presetID="1" presetClass="entr" presetSubtype="0" fill="hold" grpId="0" nodeType="clickEffect">
+                                  <p:stCondLst>
+                                    <p:cond delay="0"/>
+                                  </p:stCondLst>
+                                  <p:childTnLst>
+                                    <p:set>
+                                      <p:cBhvr>
+                                        <p:cTn id="6" dur="1" fill="hold">
+                                          <p:stCondLst>
+                                            <p:cond delay="0"/>
+                                          </p:stCondLst>
+                                        </p:cTn>
+                                        <p:tgtEl>
+                                          <p:spTgt spid="16"/>
+                                        </p:tgtEl>
+                                        <p:attrNameLst>
+                                          <p:attrName>style.visibility</p:attrName>
+                                        </p:attrNameLst>
+                                      </p:cBhvr>
+                                      <p:to>
+                                        <p:strVal val="visible"/>
+                                      </p:to>
+                                    </p:set>
+                                  </p:childTnLst>
+                                </p:cTn>
+                              </p:par>
+                              <p:par>
+                                <p:cTn id="7" presetID="1" presetClass="entr" presetSubtype="0" fill="hold" grpId="0" nodeType="withEffect">
+                                  <p:stCondLst>
+                                    <p:cond delay="0"/>
+                                  </p:stCondLst>
+                                  <p:childTnLst>
+                                    <p:set>
+                                      <p:cBhvr>
+                                        <p:cTn id="8" dur="1" fill="hold">
+                                          <p:stCondLst>
+                                            <p:cond delay="0"/>
+                                          </p:stCondLst>
+                                        </p:cTn>
+                                        <p:tgtEl>
+                                          <p:spTgt spid="25"/>
+                                        </p:tgtEl>
+                                        <p:attrNameLst>
+                                          <p:attrName>style.visibility</p:attrName>
+                                        </p:attrNameLst>
+                                      </p:cBhvr>
+                                      <p:to>
+                                        <p:strVal val="visible"/>
+                                      </p:to>
+                                    </p:set>
+                                  </p:childTnLst>
+                                </p:cTn>
+                              </p:par>
+                            </p:childTnLst>
+                          </p:cTn>
+                        </p:par>
+                      </p:childTnLst>
+                    </p:cTn>
+                  </p:par>
+                  <p:par>
+                    <p:cTn id="9" fill="hold">
+                      <p:stCondLst>
+                        <p:cond delay="indefinite"/>
+                      </p:stCondLst>
+                      <p:childTnLst>
+                        <p:par>
+                          <p:cTn id="10" fill="hold">
+                            <p:stCondLst>
+                              <p:cond delay="0"/>
+                            </p:stCondLst>
+                            <p:childTnLst>
+                              <p:par>
+                                <p:cTn id="11" presetID="1" presetClass="exit" presetSubtype="0" fill="hold" grpId="1" nodeType="clickEffect">
+                                  <p:stCondLst>
+                                    <p:cond delay="0"/>
+                                  </p:stCondLst>
+                                  <p:childTnLst>
+                                    <p:set>
+                                      <p:cBhvr>
+                                        <p:cTn id="12" dur="1" fill="hold">
+                                          <p:stCondLst>
+                                            <p:cond delay="0"/>
+                                          </p:stCondLst>
+                                        </p:cTn>
+                                        <p:tgtEl>
+                                          <p:spTgt spid="16"/>
+                                        </p:tgtEl>
+                                        <p:attrNameLst>
+                                          <p:attrName>style.visibility</p:attrName>
+                                        </p:attrNameLst>
+                                      </p:cBhvr>
+                                      <p:to>
+                                        <p:strVal val="hidden"/>
+                                      </p:to>
+                                    </p:set>
+                                  </p:childTnLst>
+                                </p:cTn>
+                              </p:par>
+                              <p:par>
+                                <p:cTn id="13" presetID="1" presetClass="exit" presetSubtype="0" fill="hold" grpId="1" nodeType="withEffect">
+                                  <p:stCondLst>
+                                    <p:cond delay="0"/>
+                                  </p:stCondLst>
+                                  <p:childTnLst>
+                                    <p:set>
+                                      <p:cBhvr>
+                                        <p:cTn id="14" dur="1" fill="hold">
+                                          <p:stCondLst>
+                                            <p:cond delay="0"/>
+                                          </p:stCondLst>
+                                        </p:cTn>
+                                        <p:tgtEl>
+                                          <p:spTgt spid="25"/>
+                                        </p:tgtEl>
+                                        <p:attrNameLst>
+                                          <p:attrName>style.visibility</p:attrName>
+                                        </p:attrNameLst>
+                                      </p:cBhvr>
+                                      <p:to>
+                                        <p:strVal val="hidden"/>
+                                      </p:to>
+                                    </p:set>
+                                  </p:childTnLst>
+                                </p:cTn>
+                              </p:par>
+                              <p:par>
+                                <p:cTn id="15" presetID="1" presetClass="entr" presetSubtype="0" fill="hold" grpId="0" nodeType="withEffect">
+                                  <p:stCondLst>
+                                    <p:cond delay="0"/>
+                                  </p:stCondLst>
+                                  <p:childTnLst>
+                                    <p:set>
+                                      <p:cBhvr>
+                                        <p:cTn id="16" dur="1" fill="hold">
+                                          <p:stCondLst>
+                                            <p:cond delay="0"/>
+                                          </p:stCondLst>
+                                        </p:cTn>
+                                        <p:tgtEl>
+                                          <p:spTgt spid="21"/>
+                                        </p:tgtEl>
+                                        <p:attrNameLst>
+                                          <p:attrName>style.visibility</p:attrName>
+                                        </p:attrNameLst>
+                                      </p:cBhvr>
+                                      <p:to>
+                                        <p:strVal val="visible"/>
+                                      </p:to>
+                                    </p:set>
+                                  </p:childTnLst>
+                                </p:cTn>
+                              </p:par>
+                              <p:par>
+                                <p:cTn id="17" presetID="1" presetClass="entr" presetSubtype="0" fill="hold" grpId="0" nodeType="withEffect">
+                                  <p:stCondLst>
+                                    <p:cond delay="0"/>
+                                  </p:stCondLst>
+                                  <p:childTnLst>
+                                    <p:set>
+                                      <p:cBhvr>
+                                        <p:cTn id="18" dur="1" fill="hold">
+                                          <p:stCondLst>
+                                            <p:cond delay="0"/>
+                                          </p:stCondLst>
+                                        </p:cTn>
+                                        <p:tgtEl>
+                                          <p:spTgt spid="22"/>
+                                        </p:tgtEl>
+                                        <p:attrNameLst>
+                                          <p:attrName>style.visibility</p:attrName>
+                                        </p:attrNameLst>
+                                      </p:cBhvr>
+                                      <p:to>
+                                        <p:strVal val="visible"/>
+                                      </p:to>
+                                    </p:set>
+                                  </p:childTnLst>
+                                </p:cTn>
+                              </p:par>
+                            </p:childTnLst>
+                          </p:cTn>
+                        </p:par>
+                      </p:childTnLst>
+                    </p:cTn>
+                  </p:par>
+                  <p:par>
+                    <p:cTn id="19" fill="hold">
+                      <p:stCondLst>
+                        <p:cond delay="indefinite"/>
+                      </p:stCondLst>
+                      <p:childTnLst>
+                        <p:par>
+                          <p:cTn id="20" fill="hold">
+                            <p:stCondLst>
+                              <p:cond delay="0"/>
+                            </p:stCondLst>
+                            <p:childTnLst>
+                              <p:par>
+                                <p:cTn id="21" presetID="1" presetClass="exit" presetSubtype="0" fill="hold" grpId="1" nodeType="clickEffect">
+                                  <p:stCondLst>
+                                    <p:cond delay="0"/>
+                                  </p:stCondLst>
+                                  <p:childTnLst>
+                                    <p:set>
+                                      <p:cBhvr>
+                                        <p:cTn id="22" dur="1" fill="hold">
+                                          <p:stCondLst>
+                                            <p:cond delay="0"/>
+                                          </p:stCondLst>
+                                        </p:cTn>
+                                        <p:tgtEl>
+                                          <p:spTgt spid="21"/>
+                                        </p:tgtEl>
+                                        <p:attrNameLst>
+                                          <p:attrName>style.visibility</p:attrName>
+                                        </p:attrNameLst>
+                                      </p:cBhvr>
+                                      <p:to>
+                                        <p:strVal val="hidden"/>
+                                      </p:to>
+                                    </p:set>
+                                  </p:childTnLst>
+                                </p:cTn>
+                              </p:par>
+                              <p:par>
+                                <p:cTn id="23" presetID="1" presetClass="exit" presetSubtype="0" fill="hold" grpId="1" nodeType="withEffect">
+                                  <p:stCondLst>
+                                    <p:cond delay="0"/>
+                                  </p:stCondLst>
+                                  <p:childTnLst>
+                                    <p:set>
+                                      <p:cBhvr>
+                                        <p:cTn id="24" dur="1" fill="hold">
+                                          <p:stCondLst>
+                                            <p:cond delay="0"/>
+                                          </p:stCondLst>
+                                        </p:cTn>
+                                        <p:tgtEl>
+                                          <p:spTgt spid="22"/>
+                                        </p:tgtEl>
+                                        <p:attrNameLst>
+                                          <p:attrName>style.visibility</p:attrName>
+                                        </p:attrNameLst>
+                                      </p:cBhvr>
+                                      <p:to>
+                                        <p:strVal val="hidden"/>
+                                      </p:to>
+                                    </p:set>
+                                  </p:childTnLst>
+                                </p:cTn>
+                              </p:par>
+                              <p:par>
+                                <p:cTn id="25" presetID="1" presetClass="entr" presetSubtype="0" fill="hold" grpId="0" nodeType="withEffect">
+                                  <p:stCondLst>
+                                    <p:cond delay="0"/>
+                                  </p:stCondLst>
+                                  <p:childTnLst>
+                                    <p:set>
+                                      <p:cBhvr>
+                                        <p:cTn id="26" dur="1" fill="hold">
+                                          <p:stCondLst>
+                                            <p:cond delay="0"/>
+                                          </p:stCondLst>
+                                        </p:cTn>
+                                        <p:tgtEl>
+                                          <p:spTgt spid="23"/>
+                                        </p:tgtEl>
+                                        <p:attrNameLst>
+                                          <p:attrName>style.visibility</p:attrName>
+                                        </p:attrNameLst>
+                                      </p:cBhvr>
+                                      <p:to>
+                                        <p:strVal val="visible"/>
+                                      </p:to>
+                                    </p:set>
+                                  </p:childTnLst>
+                                </p:cTn>
+                              </p:par>
+                              <p:par>
+                                <p:cTn id="27" presetID="1" presetClass="entr" presetSubtype="0" fill="hold" grpId="0" nodeType="withEffect">
+                                  <p:stCondLst>
+                                    <p:cond delay="0"/>
+                                  </p:stCondLst>
+                                  <p:childTnLst>
+                                    <p:set>
+                                      <p:cBhvr>
+                                        <p:cTn id="28" dur="1" fill="hold">
+                                          <p:stCondLst>
+                                            <p:cond delay="0"/>
+                                          </p:stCondLst>
+                                        </p:cTn>
+                                        <p:tgtEl>
+                                          <p:spTgt spid="24"/>
+                                        </p:tgtEl>
+                                        <p:attrNameLst>
+                                          <p:attrName>style.visibility</p:attrName>
+                                        </p:attrNameLst>
+                                      </p:cBhvr>
+                                      <p:to>
+                                        <p:strVal val="visible"/>
+                                      </p:to>
+                                    </p:set>
+                                  </p:childTnLst>
+                                </p:cTn>
+                              </p:par>
+                            </p:childTnLst>
+                          </p:cTn>
+                        </p:par>
+                      </p:childTnLst>
+                    </p:cTn>
+                  </p:par>
+                </p:childTnLst>
+              </p:cTn>
+              <p:prevCondLst>
+                <p:cond evt="onPrev" delay="0">
+                  <p:tgtEl>
+                    <p:sldTgt/>
+                  </p:tgtEl>
+                </p:cond>
+              </p:prevCondLst>
+              <p:nextCondLst>
+                <p:cond evt="onNext" delay="0">
+                  <p:tgtEl>
+                    <p:sldTgt/>
+                  </p:tgtEl>
+                </p:cond>
+              </p:nextCondLst>
+            </p:seq>
+          </p:childTnLst>
+        </p:cTn>
+      </p:par>
+    </p:tnLst>
+    <p:bldLst>
+      <p:bldP spid="16" grpId="0" animBg="1"/>
+      <p:bldP spid="16" grpId="1" animBg="1"/>
+      <p:bldP spid="21" grpId="0" animBg="1"/>
+      <p:bldP spid="21" grpId="1" animBg="1"/>
+      <p:bldP spid="22" grpId="0" animBg="1"/>
+      <p:bldP spid="22" grpId="1" animBg="1"/>
+      <p:bldP spid="23" grpId="0" animBg="1"/>
+      <p:bldP spid="24" grpId="0" animBg="1"/>
+      <p:bldP spid="25" grpId="0" animBg="1"/>
+      <p:bldP spid="25" grpId="1" animBg="1"/>
+    </p:bldLst>
   </p:timing>
 </p:sld>
 </file>

</xml_diff>